<commit_message>
modif derniere minute sur la daocuisson desole, avec integration a mon logicielempcuisson
</commit_message>
<xml_diff>
--- a/Documentation/presentation.pptx
+++ b/Documentation/presentation.pptx
@@ -5,25 +5,28 @@
     <p:sldMasterId id="2147483684" r:id="rId1"/>
   </p:sldMasterIdLst>
   <p:notesMasterIdLst>
-    <p:notesMasterId r:id="rId18"/>
+    <p:notesMasterId r:id="rId21"/>
   </p:notesMasterIdLst>
   <p:sldIdLst>
     <p:sldId id="256" r:id="rId2"/>
     <p:sldId id="265" r:id="rId3"/>
     <p:sldId id="258" r:id="rId4"/>
-    <p:sldId id="257" r:id="rId5"/>
-    <p:sldId id="268" r:id="rId6"/>
-    <p:sldId id="270" r:id="rId7"/>
-    <p:sldId id="271" r:id="rId8"/>
-    <p:sldId id="272" r:id="rId9"/>
-    <p:sldId id="259" r:id="rId10"/>
-    <p:sldId id="260" r:id="rId11"/>
-    <p:sldId id="261" r:id="rId12"/>
-    <p:sldId id="262" r:id="rId13"/>
-    <p:sldId id="269" r:id="rId14"/>
-    <p:sldId id="263" r:id="rId15"/>
-    <p:sldId id="264" r:id="rId16"/>
-    <p:sldId id="267" r:id="rId17"/>
+    <p:sldId id="274" r:id="rId5"/>
+    <p:sldId id="257" r:id="rId6"/>
+    <p:sldId id="268" r:id="rId7"/>
+    <p:sldId id="270" r:id="rId8"/>
+    <p:sldId id="271" r:id="rId9"/>
+    <p:sldId id="272" r:id="rId10"/>
+    <p:sldId id="273" r:id="rId11"/>
+    <p:sldId id="259" r:id="rId12"/>
+    <p:sldId id="260" r:id="rId13"/>
+    <p:sldId id="275" r:id="rId14"/>
+    <p:sldId id="261" r:id="rId15"/>
+    <p:sldId id="262" r:id="rId16"/>
+    <p:sldId id="269" r:id="rId17"/>
+    <p:sldId id="263" r:id="rId18"/>
+    <p:sldId id="264" r:id="rId19"/>
+    <p:sldId id="267" r:id="rId20"/>
   </p:sldIdLst>
   <p:sldSz cx="9144000" cy="6858000" type="screen4x3"/>
   <p:notesSz cx="6858000" cy="9144000"/>
@@ -3542,7 +3545,7 @@
           <a:p>
             <a:fld id="{86033872-B7B5-4114-BD3C-99A7E460DA0F}" type="datetimeFigureOut">
               <a:rPr lang="fr-FR" smtClean="0"/>
-              <a:t>30/12/2014</a:t>
+              <a:t>03/01/2015</a:t>
             </a:fld>
             <a:endParaRPr lang="fr-FR"/>
           </a:p>
@@ -3959,7 +3962,7 @@
           <a:p>
             <a:fld id="{E2994B5E-A13E-4BD3-8D15-B57FA70E9DD6}" type="slidenum">
               <a:rPr lang="fr-FR" smtClean="0"/>
-              <a:t>5</a:t>
+              <a:t>6</a:t>
             </a:fld>
             <a:endParaRPr lang="fr-FR"/>
           </a:p>
@@ -4043,7 +4046,7 @@
           <a:p>
             <a:fld id="{E2994B5E-A13E-4BD3-8D15-B57FA70E9DD6}" type="slidenum">
               <a:rPr lang="fr-FR" smtClean="0"/>
-              <a:t>6</a:t>
+              <a:t>7</a:t>
             </a:fld>
             <a:endParaRPr lang="fr-FR"/>
           </a:p>
@@ -4127,7 +4130,7 @@
           <a:p>
             <a:fld id="{E2994B5E-A13E-4BD3-8D15-B57FA70E9DD6}" type="slidenum">
               <a:rPr lang="fr-FR" smtClean="0"/>
-              <a:t>7</a:t>
+              <a:t>8</a:t>
             </a:fld>
             <a:endParaRPr lang="fr-FR"/>
           </a:p>
@@ -4211,7 +4214,7 @@
           <a:p>
             <a:fld id="{E2994B5E-A13E-4BD3-8D15-B57FA70E9DD6}" type="slidenum">
               <a:rPr lang="fr-FR" smtClean="0"/>
-              <a:t>8</a:t>
+              <a:t>9</a:t>
             </a:fld>
             <a:endParaRPr lang="fr-FR"/>
           </a:p>
@@ -4274,7 +4277,7 @@
           <a:bodyPr/>
           <a:lstStyle/>
           <a:p>
-            <a:endParaRPr lang="fr-FR"/>
+            <a:endParaRPr lang="fr-FR" dirty="0"/>
           </a:p>
         </p:txBody>
       </p:sp>
@@ -4295,7 +4298,91 @@
           <a:p>
             <a:fld id="{E2994B5E-A13E-4BD3-8D15-B57FA70E9DD6}" type="slidenum">
               <a:rPr lang="fr-FR" smtClean="0"/>
-              <a:t>13</a:t>
+              <a:t>10</a:t>
+            </a:fld>
+            <a:endParaRPr lang="fr-FR"/>
+          </a:p>
+        </p:txBody>
+      </p:sp>
+    </p:spTree>
+    <p:extLst>
+      <p:ext uri="{BB962C8B-B14F-4D97-AF65-F5344CB8AC3E}">
+        <p14:creationId xmlns:p14="http://schemas.microsoft.com/office/powerpoint/2010/main" val="3657111939"/>
+      </p:ext>
+    </p:extLst>
+  </p:cSld>
+  <p:clrMapOvr>
+    <a:masterClrMapping/>
+  </p:clrMapOvr>
+</p:notes>
+</file>
+
+<file path=ppt/notesSlides/notesSlide7.xml><?xml version="1.0" encoding="utf-8"?>
+<p:notes xmlns:a="http://schemas.openxmlformats.org/drawingml/2006/main" xmlns:r="http://schemas.openxmlformats.org/officeDocument/2006/relationships" xmlns:p="http://schemas.openxmlformats.org/presentationml/2006/main">
+  <p:cSld>
+    <p:spTree>
+      <p:nvGrpSpPr>
+        <p:cNvPr id="1" name=""/>
+        <p:cNvGrpSpPr/>
+        <p:nvPr/>
+      </p:nvGrpSpPr>
+      <p:grpSpPr>
+        <a:xfrm>
+          <a:off x="0" y="0"/>
+          <a:ext cx="0" cy="0"/>
+          <a:chOff x="0" y="0"/>
+          <a:chExt cx="0" cy="0"/>
+        </a:xfrm>
+      </p:grpSpPr>
+      <p:sp>
+        <p:nvSpPr>
+          <p:cNvPr id="2" name="Espace réservé de l'image des diapositives 1"/>
+          <p:cNvSpPr>
+            <a:spLocks noGrp="1" noRot="1" noChangeAspect="1"/>
+          </p:cNvSpPr>
+          <p:nvPr>
+            <p:ph type="sldImg"/>
+          </p:nvPr>
+        </p:nvSpPr>
+        <p:spPr/>
+      </p:sp>
+      <p:sp>
+        <p:nvSpPr>
+          <p:cNvPr id="3" name="Espace réservé des commentaires 2"/>
+          <p:cNvSpPr>
+            <a:spLocks noGrp="1"/>
+          </p:cNvSpPr>
+          <p:nvPr>
+            <p:ph type="body" idx="1"/>
+          </p:nvPr>
+        </p:nvSpPr>
+        <p:spPr/>
+        <p:txBody>
+          <a:bodyPr/>
+          <a:lstStyle/>
+          <a:p>
+            <a:endParaRPr lang="fr-FR"/>
+          </a:p>
+        </p:txBody>
+      </p:sp>
+      <p:sp>
+        <p:nvSpPr>
+          <p:cNvPr id="4" name="Espace réservé du numéro de diapositive 3"/>
+          <p:cNvSpPr>
+            <a:spLocks noGrp="1"/>
+          </p:cNvSpPr>
+          <p:nvPr>
+            <p:ph type="sldNum" sz="quarter" idx="10"/>
+          </p:nvPr>
+        </p:nvSpPr>
+        <p:spPr/>
+        <p:txBody>
+          <a:bodyPr/>
+          <a:lstStyle/>
+          <a:p>
+            <a:fld id="{E2994B5E-A13E-4BD3-8D15-B57FA70E9DD6}" type="slidenum">
+              <a:rPr lang="fr-FR" smtClean="0"/>
+              <a:t>16</a:t>
             </a:fld>
             <a:endParaRPr lang="fr-FR"/>
           </a:p>
@@ -4495,7 +4582,7 @@
           <a:p>
             <a:fld id="{C2D65230-C684-41AF-AA0D-72F719444CFB}" type="datetime1">
               <a:rPr lang="fr-FR" smtClean="0"/>
-              <a:t>30/12/2014</a:t>
+              <a:t>03/01/2015</a:t>
             </a:fld>
             <a:endParaRPr lang="fr-BE"/>
           </a:p>
@@ -4665,7 +4752,7 @@
           <a:p>
             <a:fld id="{66168C52-95ED-42C2-B895-1D2AC16AE535}" type="datetime1">
               <a:rPr lang="fr-FR" smtClean="0"/>
-              <a:t>30/12/2014</a:t>
+              <a:t>03/01/2015</a:t>
             </a:fld>
             <a:endParaRPr lang="fr-BE"/>
           </a:p>
@@ -4845,7 +4932,7 @@
           <a:p>
             <a:fld id="{97F9B326-529C-4F7B-B853-FAC68FB4BD83}" type="datetime1">
               <a:rPr lang="fr-FR" smtClean="0"/>
-              <a:t>30/12/2014</a:t>
+              <a:t>03/01/2015</a:t>
             </a:fld>
             <a:endParaRPr lang="fr-BE"/>
           </a:p>
@@ -5015,7 +5102,7 @@
           <a:p>
             <a:fld id="{BC86967F-49BF-4B16-9EF7-68DCA022A0F5}" type="datetime1">
               <a:rPr lang="fr-FR" smtClean="0"/>
-              <a:t>30/12/2014</a:t>
+              <a:t>03/01/2015</a:t>
             </a:fld>
             <a:endParaRPr lang="fr-BE"/>
           </a:p>
@@ -5261,7 +5348,7 @@
           <a:p>
             <a:fld id="{A3C54BB5-BFEE-4131-BDA5-39E825F8557C}" type="datetime1">
               <a:rPr lang="fr-FR" smtClean="0"/>
-              <a:t>30/12/2014</a:t>
+              <a:t>03/01/2015</a:t>
             </a:fld>
             <a:endParaRPr lang="fr-BE"/>
           </a:p>
@@ -5549,7 +5636,7 @@
           <a:p>
             <a:fld id="{4EEDA896-919B-40D0-B2D3-CBC5EEE1DF94}" type="datetime1">
               <a:rPr lang="fr-FR" smtClean="0"/>
-              <a:t>30/12/2014</a:t>
+              <a:t>03/01/2015</a:t>
             </a:fld>
             <a:endParaRPr lang="fr-BE"/>
           </a:p>
@@ -5971,7 +6058,7 @@
           <a:p>
             <a:fld id="{543CE89A-C400-41BE-938E-3477A7B711D4}" type="datetime1">
               <a:rPr lang="fr-FR" smtClean="0"/>
-              <a:t>30/12/2014</a:t>
+              <a:t>03/01/2015</a:t>
             </a:fld>
             <a:endParaRPr lang="fr-BE"/>
           </a:p>
@@ -6089,7 +6176,7 @@
           <a:p>
             <a:fld id="{6C84417D-1899-42AE-B438-7331E2E84D71}" type="datetime1">
               <a:rPr lang="fr-FR" smtClean="0"/>
-              <a:t>30/12/2014</a:t>
+              <a:t>03/01/2015</a:t>
             </a:fld>
             <a:endParaRPr lang="fr-BE"/>
           </a:p>
@@ -6184,7 +6271,7 @@
           <a:p>
             <a:fld id="{0A21B63A-27A0-4EE2-B3BF-BFDA56FB0AC7}" type="datetime1">
               <a:rPr lang="fr-FR" smtClean="0"/>
-              <a:t>30/12/2014</a:t>
+              <a:t>03/01/2015</a:t>
             </a:fld>
             <a:endParaRPr lang="fr-BE"/>
           </a:p>
@@ -6461,7 +6548,7 @@
           <a:p>
             <a:fld id="{F4A1703F-2DEB-4C9F-8A1E-A123D9DA669A}" type="datetime1">
               <a:rPr lang="fr-FR" smtClean="0"/>
-              <a:t>30/12/2014</a:t>
+              <a:t>03/01/2015</a:t>
             </a:fld>
             <a:endParaRPr lang="fr-BE"/>
           </a:p>
@@ -6714,7 +6801,7 @@
           <a:p>
             <a:fld id="{62027368-7A5E-4223-B763-64DAB6395145}" type="datetime1">
               <a:rPr lang="fr-FR" smtClean="0"/>
-              <a:t>30/12/2014</a:t>
+              <a:t>03/01/2015</a:t>
             </a:fld>
             <a:endParaRPr lang="fr-BE"/>
           </a:p>
@@ -6927,7 +7014,7 @@
           <a:p>
             <a:fld id="{AF8072BF-C55A-4D0D-88F2-9B6536496F70}" type="datetime1">
               <a:rPr lang="fr-FR" smtClean="0"/>
-              <a:t>30/12/2014</a:t>
+              <a:t>03/01/2015</a:t>
             </a:fld>
             <a:endParaRPr lang="fr-BE"/>
           </a:p>
@@ -11162,7 +11249,7 @@
                   <a:schemeClr val="bg1"/>
                 </a:solidFill>
               </a:rPr>
-              <a:t>30/12/2014</a:t>
+              <a:t>03/01/2015</a:t>
             </a:fld>
             <a:endParaRPr lang="fr-BE" sz="2000" dirty="0">
               <a:solidFill>
@@ -11259,37 +11346,13 @@
                   <a:srgbClr val="336699"/>
                 </a:solidFill>
               </a:rPr>
-              <a:t>Présentation du logiciel</a:t>
+              <a:t>La base de données</a:t>
             </a:r>
             <a:endParaRPr lang="fr-FR" dirty="0">
               <a:solidFill>
                 <a:srgbClr val="336699"/>
               </a:solidFill>
             </a:endParaRPr>
-          </a:p>
-        </p:txBody>
-      </p:sp>
-      <p:sp>
-        <p:nvSpPr>
-          <p:cNvPr id="3" name="Espace réservé du contenu 2"/>
-          <p:cNvSpPr>
-            <a:spLocks noGrp="1"/>
-          </p:cNvSpPr>
-          <p:nvPr>
-            <p:ph idx="1"/>
-          </p:nvPr>
-        </p:nvSpPr>
-        <p:spPr/>
-        <p:txBody>
-          <a:bodyPr/>
-          <a:lstStyle/>
-          <a:p>
-            <a:pPr>
-              <a:buClr>
-                <a:srgbClr val="6699CC"/>
-              </a:buClr>
-            </a:pPr>
-            <a:endParaRPr lang="fr-FR" dirty="0"/>
           </a:p>
         </p:txBody>
       </p:sp>
@@ -11310,7 +11373,7 @@
           <a:p>
             <a:fld id="{A5DF02B5-C084-4573-B9AA-1687D980E5FB}" type="datetime1">
               <a:rPr lang="fr-FR" smtClean="0"/>
-              <a:t>30/12/2014</a:t>
+              <a:t>03/01/2015</a:t>
             </a:fld>
             <a:endParaRPr lang="fr-BE"/>
           </a:p>
@@ -11400,7 +11463,7 @@
                   </a:schemeClr>
                 </a:solidFill>
               </a:rPr>
-              <a:t>Choix techniques et d’architecture</a:t>
+              <a:t>Présentation du logiciel</a:t>
             </a:r>
             <a:endParaRPr lang="fr-FR" dirty="0">
               <a:solidFill>
@@ -11412,10 +11475,102 @@
           </a:p>
         </p:txBody>
       </p:sp>
+      <p:sp>
+        <p:nvSpPr>
+          <p:cNvPr id="3" name="Espace réservé du contenu 2"/>
+          <p:cNvSpPr>
+            <a:spLocks noGrp="1"/>
+          </p:cNvSpPr>
+          <p:nvPr>
+            <p:ph idx="1"/>
+          </p:nvPr>
+        </p:nvSpPr>
+        <p:spPr>
+          <a:xfrm>
+            <a:off x="457200" y="1600200"/>
+            <a:ext cx="8229600" cy="4349079"/>
+          </a:xfrm>
+        </p:spPr>
+        <p:txBody>
+          <a:bodyPr/>
+          <a:lstStyle/>
+          <a:p>
+            <a:pPr>
+              <a:buClr>
+                <a:srgbClr val="6699CC"/>
+              </a:buClr>
+            </a:pPr>
+            <a:r>
+              <a:rPr lang="fr-FR" dirty="0" smtClean="0"/>
+              <a:t>Point central du logiciel</a:t>
+            </a:r>
+          </a:p>
+          <a:p>
+            <a:pPr lvl="1">
+              <a:buClr>
+                <a:srgbClr val="6699CC"/>
+              </a:buClr>
+            </a:pPr>
+            <a:r>
+              <a:rPr lang="fr-FR" dirty="0" smtClean="0"/>
+              <a:t>Supporte les multi-connexions</a:t>
+            </a:r>
+          </a:p>
+          <a:p>
+            <a:pPr lvl="1">
+              <a:buClr>
+                <a:srgbClr val="6699CC"/>
+              </a:buClr>
+            </a:pPr>
+            <a:r>
+              <a:rPr lang="fr-FR" dirty="0" smtClean="0"/>
+              <a:t>Centralise les données pour les différentes interfaces actives</a:t>
+            </a:r>
+          </a:p>
+          <a:p>
+            <a:pPr lvl="1">
+              <a:buClr>
+                <a:srgbClr val="6699CC"/>
+              </a:buClr>
+            </a:pPr>
+            <a:endParaRPr lang="fr-FR" dirty="0" smtClean="0"/>
+          </a:p>
+          <a:p>
+            <a:pPr>
+              <a:buClr>
+                <a:srgbClr val="6699CC"/>
+              </a:buClr>
+            </a:pPr>
+            <a:r>
+              <a:rPr lang="fr-FR" dirty="0" smtClean="0"/>
+              <a:t>Stocke les informations </a:t>
+            </a:r>
+          </a:p>
+          <a:p>
+            <a:pPr lvl="1">
+              <a:buClr>
+                <a:srgbClr val="6699CC"/>
+              </a:buClr>
+            </a:pPr>
+            <a:r>
+              <a:rPr lang="fr-FR" dirty="0" smtClean="0"/>
+              <a:t>Produit, Vente, Commande, Utilisateur, etc.</a:t>
+            </a:r>
+          </a:p>
+          <a:p>
+            <a:pPr>
+              <a:buClr>
+                <a:srgbClr val="6699CC"/>
+              </a:buClr>
+            </a:pPr>
+            <a:endParaRPr lang="fr-FR" dirty="0" smtClean="0"/>
+          </a:p>
+        </p:txBody>
+      </p:sp>
     </p:spTree>
     <p:extLst>
       <p:ext uri="{BB962C8B-B14F-4D97-AF65-F5344CB8AC3E}">
-        <p14:creationId xmlns:p14="http://schemas.microsoft.com/office/powerpoint/2010/main" val="4128894042"/>
+        <p14:creationId xmlns:p14="http://schemas.microsoft.com/office/powerpoint/2010/main" val="1147422618"/>
       </p:ext>
     </p:extLst>
   </p:cSld>
@@ -11475,7 +11630,7 @@
                   <a:srgbClr val="336699"/>
                 </a:solidFill>
               </a:rPr>
-              <a:t>Avantages et limites du produit</a:t>
+              <a:t>Choix techniques et d’architecture</a:t>
             </a:r>
             <a:endParaRPr lang="fr-FR" dirty="0">
               <a:solidFill>
@@ -11502,7 +11657,7 @@
           <a:p>
             <a:fld id="{C2D65230-C684-41AF-AA0D-72F719444CFB}" type="datetime1">
               <a:rPr lang="fr-FR" smtClean="0"/>
-              <a:t>30/12/2014</a:t>
+              <a:t>03/01/2015</a:t>
             </a:fld>
             <a:endParaRPr lang="fr-BE"/>
           </a:p>
@@ -11643,52 +11798,13 @@
                   <a:srgbClr val="336699"/>
                 </a:solidFill>
               </a:rPr>
-              <a:t>Les avantages</a:t>
+              <a:t>Choix d’architecture</a:t>
             </a:r>
             <a:endParaRPr lang="fr-FR" dirty="0">
               <a:solidFill>
                 <a:srgbClr val="336699"/>
               </a:solidFill>
             </a:endParaRPr>
-          </a:p>
-        </p:txBody>
-      </p:sp>
-      <p:sp>
-        <p:nvSpPr>
-          <p:cNvPr id="3" name="Espace réservé du contenu 2"/>
-          <p:cNvSpPr>
-            <a:spLocks noGrp="1"/>
-          </p:cNvSpPr>
-          <p:nvPr>
-            <p:ph idx="1"/>
-          </p:nvPr>
-        </p:nvSpPr>
-        <p:spPr/>
-        <p:txBody>
-          <a:bodyPr/>
-          <a:lstStyle/>
-          <a:p>
-            <a:pPr>
-              <a:buClr>
-                <a:srgbClr val="6699CC"/>
-              </a:buClr>
-            </a:pPr>
-            <a:r>
-              <a:rPr lang="fr-FR" dirty="0" smtClean="0"/>
-              <a:t>Visualisation en temps réel sans devoir réactualiser</a:t>
-            </a:r>
-          </a:p>
-          <a:p>
-            <a:pPr>
-              <a:buClr>
-                <a:srgbClr val="6699CC"/>
-              </a:buClr>
-            </a:pPr>
-            <a:r>
-              <a:rPr lang="fr-FR" dirty="0" smtClean="0"/>
-              <a:t>Fort contraste des différentes zones des interfaces</a:t>
-            </a:r>
-            <a:endParaRPr lang="fr-FR" dirty="0"/>
           </a:p>
         </p:txBody>
       </p:sp>
@@ -11709,7 +11825,7 @@
           <a:p>
             <a:fld id="{A5DF02B5-C084-4573-B9AA-1687D980E5FB}" type="datetime1">
               <a:rPr lang="fr-FR" smtClean="0"/>
-              <a:t>30/12/2014</a:t>
+              <a:t>03/01/2015</a:t>
             </a:fld>
             <a:endParaRPr lang="fr-BE"/>
           </a:p>
@@ -11799,7 +11915,7 @@
                   </a:schemeClr>
                 </a:solidFill>
               </a:rPr>
-              <a:t>Avantages et limites du produit</a:t>
+              <a:t>Choix techniques et d’architecture</a:t>
             </a:r>
             <a:endParaRPr lang="fr-FR" dirty="0">
               <a:solidFill>
@@ -11808,6 +11924,116 @@
                 </a:schemeClr>
               </a:solidFill>
             </a:endParaRPr>
+          </a:p>
+        </p:txBody>
+      </p:sp>
+      <p:pic>
+        <p:nvPicPr>
+          <p:cNvPr id="1026" name="Picture 2"/>
+          <p:cNvPicPr>
+            <a:picLocks noChangeAspect="1" noChangeArrowheads="1"/>
+          </p:cNvPicPr>
+          <p:nvPr/>
+        </p:nvPicPr>
+        <p:blipFill>
+          <a:blip r:embed="rId2">
+            <a:extLst>
+              <a:ext uri="{28A0092B-C50C-407E-A947-70E740481C1C}">
+                <a14:useLocalDpi xmlns:a14="http://schemas.microsoft.com/office/drawing/2010/main" val="0"/>
+              </a:ext>
+            </a:extLst>
+          </a:blip>
+          <a:srcRect/>
+          <a:stretch>
+            <a:fillRect/>
+          </a:stretch>
+        </p:blipFill>
+        <p:spPr bwMode="auto">
+          <a:xfrm>
+            <a:off x="690563" y="1412776"/>
+            <a:ext cx="7762875" cy="1447800"/>
+          </a:xfrm>
+          <a:prstGeom prst="rect">
+            <a:avLst/>
+          </a:prstGeom>
+          <a:noFill/>
+          <a:ln>
+            <a:noFill/>
+          </a:ln>
+          <a:extLst>
+            <a:ext uri="{909E8E84-426E-40DD-AFC4-6F175D3DCCD1}">
+              <a14:hiddenFill xmlns:a14="http://schemas.microsoft.com/office/drawing/2010/main">
+                <a:solidFill>
+                  <a:schemeClr val="accent1"/>
+                </a:solidFill>
+              </a14:hiddenFill>
+            </a:ext>
+            <a:ext uri="{91240B29-F687-4F45-9708-019B960494DF}">
+              <a14:hiddenLine xmlns:a14="http://schemas.microsoft.com/office/drawing/2010/main" w="9525">
+                <a:solidFill>
+                  <a:schemeClr val="tx1"/>
+                </a:solidFill>
+                <a:miter lim="800000"/>
+                <a:headEnd/>
+                <a:tailEnd/>
+              </a14:hiddenLine>
+            </a:ext>
+          </a:extLst>
+        </p:spPr>
+      </p:pic>
+      <p:sp>
+        <p:nvSpPr>
+          <p:cNvPr id="17" name="Espace réservé du contenu 2"/>
+          <p:cNvSpPr>
+            <a:spLocks noGrp="1"/>
+          </p:cNvSpPr>
+          <p:nvPr>
+            <p:ph idx="1"/>
+          </p:nvPr>
+        </p:nvSpPr>
+        <p:spPr>
+          <a:xfrm>
+            <a:off x="457200" y="3212976"/>
+            <a:ext cx="8229600" cy="2913187"/>
+          </a:xfrm>
+        </p:spPr>
+        <p:txBody>
+          <a:bodyPr/>
+          <a:lstStyle/>
+          <a:p>
+            <a:pPr>
+              <a:buClr>
+                <a:srgbClr val="6699CC"/>
+              </a:buClr>
+            </a:pPr>
+            <a:r>
+              <a:rPr lang="fr-FR" dirty="0" smtClean="0"/>
+              <a:t>Cette séparation facilite</a:t>
+            </a:r>
+            <a:endParaRPr lang="fr-FR" dirty="0" smtClean="0"/>
+          </a:p>
+          <a:p>
+            <a:pPr lvl="1">
+              <a:buClr>
+                <a:srgbClr val="6699CC"/>
+              </a:buClr>
+            </a:pPr>
+            <a:r>
+              <a:rPr lang="fr-FR" dirty="0" smtClean="0"/>
+              <a:t>L’ajout de fonctionnalité</a:t>
+            </a:r>
+          </a:p>
+          <a:p>
+            <a:pPr lvl="1">
+              <a:buClr>
+                <a:srgbClr val="6699CC"/>
+              </a:buClr>
+            </a:pPr>
+            <a:r>
+              <a:rPr lang="fr-FR" dirty="0" smtClean="0"/>
+              <a:t>La modification de l’interface graphique</a:t>
+            </a:r>
+            <a:endParaRPr lang="fr-FR" dirty="0" smtClean="0"/>
           </a:p>
         </p:txBody>
       </p:sp>
@@ -11875,7 +12101,7 @@
                   <a:srgbClr val="336699"/>
                 </a:solidFill>
               </a:rPr>
-              <a:t>Les limites</a:t>
+              <a:t>Choix techniques</a:t>
             </a:r>
             <a:endParaRPr lang="fr-FR" dirty="0">
               <a:solidFill>
@@ -11907,7 +12133,29 @@
             </a:pPr>
             <a:r>
               <a:rPr lang="fr-FR" dirty="0" smtClean="0"/>
-              <a:t>Design</a:t>
+              <a:t>Deux systèmes mis en place</a:t>
+            </a:r>
+          </a:p>
+          <a:p>
+            <a:pPr lvl="1">
+              <a:buClr>
+                <a:srgbClr val="6699CC"/>
+              </a:buClr>
+            </a:pPr>
+            <a:r>
+              <a:rPr lang="fr-FR" dirty="0" smtClean="0"/>
+              <a:t>Stockage des données BDD dans objets JAVA</a:t>
+            </a:r>
+          </a:p>
+          <a:p>
+            <a:pPr lvl="1">
+              <a:buClr>
+                <a:srgbClr val="6699CC"/>
+              </a:buClr>
+            </a:pPr>
+            <a:r>
+              <a:rPr lang="fr-FR" dirty="0" smtClean="0"/>
+              <a:t>Accès direct au données de la BDD sans stockage</a:t>
             </a:r>
           </a:p>
           <a:p>
@@ -11918,7 +12166,11 @@
             </a:pPr>
             <a:r>
               <a:rPr lang="fr-FR" dirty="0" smtClean="0"/>
-              <a:t>Gestion membres et types de produit</a:t>
+              <a:t>Utilisation des objets JAVA </a:t>
+            </a:r>
+            <a:r>
+              <a:rPr lang="fr-FR" dirty="0" err="1" smtClean="0"/>
+              <a:t>JTable</a:t>
             </a:r>
             <a:endParaRPr lang="fr-FR" dirty="0"/>
           </a:p>
@@ -11941,7 +12193,7 @@
           <a:p>
             <a:fld id="{A5DF02B5-C084-4573-B9AA-1687D980E5FB}" type="datetime1">
               <a:rPr lang="fr-FR" smtClean="0"/>
-              <a:t>30/12/2014</a:t>
+              <a:t>03/01/2015</a:t>
             </a:fld>
             <a:endParaRPr lang="fr-BE"/>
           </a:p>
@@ -12031,7 +12283,7 @@
                   </a:schemeClr>
                 </a:solidFill>
               </a:rPr>
-              <a:t>Présentation du logiciel</a:t>
+              <a:t>Choix techniques et d’architecture</a:t>
             </a:r>
             <a:endParaRPr lang="fr-FR" dirty="0">
               <a:solidFill>
@@ -12046,7 +12298,7 @@
     </p:spTree>
     <p:extLst>
       <p:ext uri="{BB962C8B-B14F-4D97-AF65-F5344CB8AC3E}">
-        <p14:creationId xmlns:p14="http://schemas.microsoft.com/office/powerpoint/2010/main" val="2873897975"/>
+        <p14:creationId xmlns:p14="http://schemas.microsoft.com/office/powerpoint/2010/main" val="757140440"/>
       </p:ext>
     </p:extLst>
   </p:cSld>
@@ -12106,7 +12358,7 @@
                   <a:srgbClr val="336699"/>
                 </a:solidFill>
               </a:rPr>
-              <a:t>Démonstration du logiciel</a:t>
+              <a:t>Avantages et limites du produit</a:t>
             </a:r>
             <a:endParaRPr lang="fr-FR" dirty="0">
               <a:solidFill>
@@ -12133,7 +12385,7 @@
           <a:p>
             <a:fld id="{C2D65230-C684-41AF-AA0D-72F719444CFB}" type="datetime1">
               <a:rPr lang="fr-FR" smtClean="0"/>
-              <a:t>30/12/2014</a:t>
+              <a:t>03/01/2015</a:t>
             </a:fld>
             <a:endParaRPr lang="fr-BE"/>
           </a:p>
@@ -12274,7 +12526,7 @@
                   <a:srgbClr val="336699"/>
                 </a:solidFill>
               </a:rPr>
-              <a:t>Démonstration</a:t>
+              <a:t>Les avantages</a:t>
             </a:r>
             <a:endParaRPr lang="fr-FR" dirty="0">
               <a:solidFill>
@@ -12305,18 +12557,62 @@
               </a:buClr>
             </a:pPr>
             <a:r>
-              <a:rPr lang="fr-FR" dirty="0" smtClean="0">
-                <a:solidFill>
-                  <a:srgbClr val="FF0000"/>
-                </a:solidFill>
-              </a:rPr>
-              <a:t>Faire la time line de ce que l’on démontre dans sur le logiciel</a:t>
+              <a:rPr lang="fr-FR" dirty="0" smtClean="0"/>
+              <a:t>Visualisation en temps réel </a:t>
             </a:r>
-            <a:endParaRPr lang="fr-FR" dirty="0">
-              <a:solidFill>
-                <a:srgbClr val="FF0000"/>
-              </a:solidFill>
-            </a:endParaRPr>
+          </a:p>
+          <a:p>
+            <a:pPr lvl="1">
+              <a:buClr>
+                <a:srgbClr val="6699CC"/>
+              </a:buClr>
+            </a:pPr>
+            <a:r>
+              <a:rPr lang="fr-FR" dirty="0" smtClean="0"/>
+              <a:t>Actualisation automatique</a:t>
+            </a:r>
+          </a:p>
+          <a:p>
+            <a:pPr lvl="1">
+              <a:buClr>
+                <a:srgbClr val="6699CC"/>
+              </a:buClr>
+            </a:pPr>
+            <a:r>
+              <a:rPr lang="fr-FR" dirty="0" smtClean="0"/>
+              <a:t>Aucune action utilisateur nécessaire</a:t>
+            </a:r>
+          </a:p>
+          <a:p>
+            <a:pPr lvl="1">
+              <a:buClr>
+                <a:srgbClr val="6699CC"/>
+              </a:buClr>
+            </a:pPr>
+            <a:endParaRPr lang="fr-FR" dirty="0"/>
+          </a:p>
+          <a:p>
+            <a:pPr>
+              <a:buClr>
+                <a:srgbClr val="6699CC"/>
+              </a:buClr>
+            </a:pPr>
+            <a:r>
+              <a:rPr lang="fr-FR" dirty="0" smtClean="0"/>
+              <a:t>Fort contraste des différentes zones des interfaces</a:t>
+            </a:r>
+          </a:p>
+          <a:p>
+            <a:pPr lvl="1">
+              <a:buClr>
+                <a:srgbClr val="6699CC"/>
+              </a:buClr>
+            </a:pPr>
+            <a:r>
+              <a:rPr lang="fr-FR" dirty="0" smtClean="0"/>
+              <a:t>Meilleure visualisation pour l’utilisateur</a:t>
+            </a:r>
+            <a:endParaRPr lang="fr-FR" dirty="0"/>
           </a:p>
         </p:txBody>
       </p:sp>
@@ -12337,7 +12633,7 @@
           <a:p>
             <a:fld id="{A5DF02B5-C084-4573-B9AA-1687D980E5FB}" type="datetime1">
               <a:rPr lang="fr-FR" smtClean="0"/>
-              <a:t>30/12/2014</a:t>
+              <a:t>03/01/2015</a:t>
             </a:fld>
             <a:endParaRPr lang="fr-BE"/>
           </a:p>
@@ -12427,7 +12723,7 @@
                   </a:schemeClr>
                 </a:solidFill>
               </a:rPr>
-              <a:t>Démonstration du logiciel</a:t>
+              <a:t>Avantages et limites du produit</a:t>
             </a:r>
             <a:endParaRPr lang="fr-FR" dirty="0">
               <a:solidFill>
@@ -12478,6 +12774,183 @@
       </p:grpSpPr>
       <p:sp>
         <p:nvSpPr>
+          <p:cNvPr id="2" name="Titre 1"/>
+          <p:cNvSpPr>
+            <a:spLocks noGrp="1"/>
+          </p:cNvSpPr>
+          <p:nvPr>
+            <p:ph type="title"/>
+          </p:nvPr>
+        </p:nvSpPr>
+        <p:spPr>
+          <a:xfrm>
+            <a:off x="446856" y="188640"/>
+            <a:ext cx="8373616" cy="796950"/>
+          </a:xfrm>
+        </p:spPr>
+        <p:txBody>
+          <a:bodyPr/>
+          <a:lstStyle/>
+          <a:p>
+            <a:pPr algn="r"/>
+            <a:r>
+              <a:rPr lang="fr-FR" dirty="0" smtClean="0">
+                <a:solidFill>
+                  <a:srgbClr val="336699"/>
+                </a:solidFill>
+              </a:rPr>
+              <a:t>Les limites</a:t>
+            </a:r>
+            <a:endParaRPr lang="fr-FR" dirty="0">
+              <a:solidFill>
+                <a:srgbClr val="336699"/>
+              </a:solidFill>
+            </a:endParaRPr>
+          </a:p>
+        </p:txBody>
+      </p:sp>
+      <p:sp>
+        <p:nvSpPr>
+          <p:cNvPr id="3" name="Espace réservé du contenu 2"/>
+          <p:cNvSpPr>
+            <a:spLocks noGrp="1"/>
+          </p:cNvSpPr>
+          <p:nvPr>
+            <p:ph idx="1"/>
+          </p:nvPr>
+        </p:nvSpPr>
+        <p:spPr/>
+        <p:txBody>
+          <a:bodyPr/>
+          <a:lstStyle/>
+          <a:p>
+            <a:pPr>
+              <a:buClr>
+                <a:srgbClr val="6699CC"/>
+              </a:buClr>
+            </a:pPr>
+            <a:r>
+              <a:rPr lang="fr-FR" dirty="0" smtClean="0"/>
+              <a:t>Design</a:t>
+            </a:r>
+          </a:p>
+          <a:p>
+            <a:pPr lvl="1">
+              <a:buClr>
+                <a:srgbClr val="6699CC"/>
+              </a:buClr>
+            </a:pPr>
+            <a:r>
+              <a:rPr lang="fr-FR" dirty="0" smtClean="0"/>
+              <a:t>Minimaliste</a:t>
+            </a:r>
+          </a:p>
+          <a:p>
+            <a:pPr lvl="1">
+              <a:buClr>
+                <a:srgbClr val="6699CC"/>
+              </a:buClr>
+              <a:buFont typeface="Symbol"/>
+              <a:buChar char="Þ"/>
+            </a:pPr>
+            <a:r>
+              <a:rPr lang="fr-FR" dirty="0" smtClean="0"/>
+              <a:t> Evite de surcharger les interfaces</a:t>
+            </a:r>
+          </a:p>
+          <a:p>
+            <a:pPr lvl="1">
+              <a:buClr>
+                <a:srgbClr val="6699CC"/>
+              </a:buClr>
+              <a:buFont typeface="Symbol"/>
+              <a:buChar char="Þ"/>
+            </a:pPr>
+            <a:endParaRPr lang="fr-FR" dirty="0" smtClean="0"/>
+          </a:p>
+          <a:p>
+            <a:pPr>
+              <a:buClr>
+                <a:srgbClr val="6699CC"/>
+              </a:buClr>
+            </a:pPr>
+            <a:r>
+              <a:rPr lang="fr-FR" dirty="0" smtClean="0"/>
+              <a:t>Gestion membres et types de produit</a:t>
+            </a:r>
+          </a:p>
+          <a:p>
+            <a:pPr lvl="1">
+              <a:buClr>
+                <a:srgbClr val="6699CC"/>
+              </a:buClr>
+            </a:pPr>
+            <a:r>
+              <a:rPr lang="fr-FR" dirty="0" smtClean="0"/>
+              <a:t>Non disponible actuellement pour le manager</a:t>
+            </a:r>
+          </a:p>
+          <a:p>
+            <a:pPr lvl="1">
+              <a:buClr>
+                <a:srgbClr val="6699CC"/>
+              </a:buClr>
+            </a:pPr>
+            <a:r>
+              <a:rPr lang="fr-FR" dirty="0" smtClean="0"/>
+              <a:t>Informations pré-rentrées en base de données</a:t>
+            </a:r>
+          </a:p>
+          <a:p>
+            <a:pPr lvl="1">
+              <a:buClr>
+                <a:srgbClr val="6699CC"/>
+              </a:buClr>
+              <a:buFont typeface="Symbol"/>
+              <a:buChar char="Þ"/>
+            </a:pPr>
+            <a:r>
+              <a:rPr lang="fr-FR" dirty="0" smtClean="0"/>
+              <a:t> Interface graphique en développant</a:t>
+            </a:r>
+          </a:p>
+          <a:p>
+            <a:pPr lvl="1">
+              <a:buClr>
+                <a:srgbClr val="6699CC"/>
+              </a:buClr>
+              <a:buFont typeface="Symbol"/>
+              <a:buChar char="Þ"/>
+            </a:pPr>
+            <a:endParaRPr lang="fr-FR" dirty="0"/>
+          </a:p>
+        </p:txBody>
+      </p:sp>
+      <p:sp>
+        <p:nvSpPr>
+          <p:cNvPr id="4" name="Espace réservé de la date 3"/>
+          <p:cNvSpPr>
+            <a:spLocks noGrp="1"/>
+          </p:cNvSpPr>
+          <p:nvPr>
+            <p:ph type="dt" sz="half" idx="10"/>
+          </p:nvPr>
+        </p:nvSpPr>
+        <p:spPr/>
+        <p:txBody>
+          <a:bodyPr/>
+          <a:lstStyle/>
+          <a:p>
+            <a:fld id="{A5DF02B5-C084-4573-B9AA-1687D980E5FB}" type="datetime1">
+              <a:rPr lang="fr-FR" smtClean="0"/>
+              <a:t>03/01/2015</a:t>
+            </a:fld>
+            <a:endParaRPr lang="fr-BE"/>
+          </a:p>
+        </p:txBody>
+      </p:sp>
+      <p:sp>
+        <p:nvSpPr>
           <p:cNvPr id="5" name="Espace réservé du numéro de diapositive 4"/>
           <p:cNvSpPr>
             <a:spLocks noGrp="1"/>
@@ -12494,6 +12967,546 @@
             <a:fld id="{CF4668DC-857F-487D-BFFA-8C0CA5037977}" type="slidenum">
               <a:rPr lang="fr-BE" smtClean="0"/>
               <a:t>16</a:t>
+            </a:fld>
+            <a:endParaRPr lang="fr-BE"/>
+          </a:p>
+        </p:txBody>
+      </p:sp>
+      <p:cxnSp>
+        <p:nvCxnSpPr>
+          <p:cNvPr id="8" name="Connecteur droit 7"/>
+          <p:cNvCxnSpPr/>
+          <p:nvPr/>
+        </p:nvCxnSpPr>
+        <p:spPr>
+          <a:xfrm>
+            <a:off x="467544" y="908720"/>
+            <a:ext cx="8208912" cy="0"/>
+          </a:xfrm>
+          <a:prstGeom prst="line">
+            <a:avLst/>
+          </a:prstGeom>
+        </p:spPr>
+        <p:style>
+          <a:lnRef idx="1">
+            <a:schemeClr val="accent1"/>
+          </a:lnRef>
+          <a:fillRef idx="0">
+            <a:schemeClr val="accent1"/>
+          </a:fillRef>
+          <a:effectRef idx="0">
+            <a:schemeClr val="accent1"/>
+          </a:effectRef>
+          <a:fontRef idx="minor">
+            <a:schemeClr val="tx1"/>
+          </a:fontRef>
+        </p:style>
+      </p:cxnSp>
+      <p:sp>
+        <p:nvSpPr>
+          <p:cNvPr id="10" name="ZoneTexte 9"/>
+          <p:cNvSpPr txBox="1"/>
+          <p:nvPr/>
+        </p:nvSpPr>
+        <p:spPr>
+          <a:xfrm>
+            <a:off x="1763777" y="6309320"/>
+            <a:ext cx="5616446" cy="369332"/>
+          </a:xfrm>
+          <a:prstGeom prst="rect">
+            <a:avLst/>
+          </a:prstGeom>
+          <a:noFill/>
+        </p:spPr>
+        <p:txBody>
+          <a:bodyPr wrap="square" rtlCol="0">
+            <a:spAutoFit/>
+          </a:bodyPr>
+          <a:lstStyle/>
+          <a:p>
+            <a:pPr algn="ctr"/>
+            <a:r>
+              <a:rPr lang="fr-FR" dirty="0" smtClean="0">
+                <a:solidFill>
+                  <a:schemeClr val="bg1">
+                    <a:lumMod val="50000"/>
+                  </a:schemeClr>
+                </a:solidFill>
+              </a:rPr>
+              <a:t>Présentation du logiciel</a:t>
+            </a:r>
+            <a:endParaRPr lang="fr-FR" dirty="0">
+              <a:solidFill>
+                <a:schemeClr val="bg1">
+                  <a:lumMod val="50000"/>
+                </a:schemeClr>
+              </a:solidFill>
+            </a:endParaRPr>
+          </a:p>
+        </p:txBody>
+      </p:sp>
+    </p:spTree>
+    <p:extLst>
+      <p:ext uri="{BB962C8B-B14F-4D97-AF65-F5344CB8AC3E}">
+        <p14:creationId xmlns:p14="http://schemas.microsoft.com/office/powerpoint/2010/main" val="2873897975"/>
+      </p:ext>
+    </p:extLst>
+  </p:cSld>
+  <p:clrMapOvr>
+    <a:masterClrMapping/>
+  </p:clrMapOvr>
+  <p:timing>
+    <p:tnLst>
+      <p:par>
+        <p:cTn id="1" dur="indefinite" restart="never" nodeType="tmRoot"/>
+      </p:par>
+    </p:tnLst>
+  </p:timing>
+</p:sld>
+</file>
+
+<file path=ppt/slides/slide17.xml><?xml version="1.0" encoding="utf-8"?>
+<p:sld xmlns:a="http://schemas.openxmlformats.org/drawingml/2006/main" xmlns:r="http://schemas.openxmlformats.org/officeDocument/2006/relationships" xmlns:p="http://schemas.openxmlformats.org/presentationml/2006/main">
+  <p:cSld>
+    <p:spTree>
+      <p:nvGrpSpPr>
+        <p:cNvPr id="1" name=""/>
+        <p:cNvGrpSpPr/>
+        <p:nvPr/>
+      </p:nvGrpSpPr>
+      <p:grpSpPr>
+        <a:xfrm>
+          <a:off x="0" y="0"/>
+          <a:ext cx="0" cy="0"/>
+          <a:chOff x="0" y="0"/>
+          <a:chExt cx="0" cy="0"/>
+        </a:xfrm>
+      </p:grpSpPr>
+      <p:sp>
+        <p:nvSpPr>
+          <p:cNvPr id="6" name="Titre 5"/>
+          <p:cNvSpPr>
+            <a:spLocks noGrp="1"/>
+          </p:cNvSpPr>
+          <p:nvPr>
+            <p:ph type="title"/>
+          </p:nvPr>
+        </p:nvSpPr>
+        <p:spPr>
+          <a:xfrm>
+            <a:off x="685800" y="2636912"/>
+            <a:ext cx="7772400" cy="1362075"/>
+          </a:xfrm>
+        </p:spPr>
+        <p:txBody>
+          <a:bodyPr/>
+          <a:lstStyle/>
+          <a:p>
+            <a:r>
+              <a:rPr lang="fr-FR" dirty="0" smtClean="0">
+                <a:solidFill>
+                  <a:srgbClr val="336699"/>
+                </a:solidFill>
+              </a:rPr>
+              <a:t>Démonstration du logiciel</a:t>
+            </a:r>
+            <a:endParaRPr lang="fr-FR" dirty="0">
+              <a:solidFill>
+                <a:srgbClr val="336699"/>
+              </a:solidFill>
+            </a:endParaRPr>
+          </a:p>
+        </p:txBody>
+      </p:sp>
+      <p:sp>
+        <p:nvSpPr>
+          <p:cNvPr id="4" name="Espace réservé de la date 3"/>
+          <p:cNvSpPr>
+            <a:spLocks noGrp="1"/>
+          </p:cNvSpPr>
+          <p:nvPr>
+            <p:ph type="dt" sz="half" idx="10"/>
+          </p:nvPr>
+        </p:nvSpPr>
+        <p:spPr/>
+        <p:txBody>
+          <a:bodyPr/>
+          <a:lstStyle/>
+          <a:p>
+            <a:fld id="{C2D65230-C684-41AF-AA0D-72F719444CFB}" type="datetime1">
+              <a:rPr lang="fr-FR" smtClean="0"/>
+              <a:t>03/01/2015</a:t>
+            </a:fld>
+            <a:endParaRPr lang="fr-BE"/>
+          </a:p>
+        </p:txBody>
+      </p:sp>
+      <p:sp>
+        <p:nvSpPr>
+          <p:cNvPr id="5" name="Espace réservé du numéro de diapositive 4"/>
+          <p:cNvSpPr>
+            <a:spLocks noGrp="1"/>
+          </p:cNvSpPr>
+          <p:nvPr>
+            <p:ph type="sldNum" sz="quarter" idx="12"/>
+          </p:nvPr>
+        </p:nvSpPr>
+        <p:spPr/>
+        <p:txBody>
+          <a:bodyPr/>
+          <a:lstStyle/>
+          <a:p>
+            <a:fld id="{CF4668DC-857F-487D-BFFA-8C0CA5037977}" type="slidenum">
+              <a:rPr lang="fr-BE" smtClean="0"/>
+              <a:t>17</a:t>
+            </a:fld>
+            <a:endParaRPr lang="fr-BE"/>
+          </a:p>
+        </p:txBody>
+      </p:sp>
+      <p:sp>
+        <p:nvSpPr>
+          <p:cNvPr id="9" name="Rectangle 8"/>
+          <p:cNvSpPr/>
+          <p:nvPr/>
+        </p:nvSpPr>
+        <p:spPr>
+          <a:xfrm>
+            <a:off x="0" y="4196234"/>
+            <a:ext cx="9144000" cy="360040"/>
+          </a:xfrm>
+          <a:prstGeom prst="rect">
+            <a:avLst/>
+          </a:prstGeom>
+          <a:solidFill>
+            <a:schemeClr val="tx2"/>
+          </a:solidFill>
+          <a:ln>
+            <a:solidFill>
+              <a:schemeClr val="tx2"/>
+            </a:solidFill>
+          </a:ln>
+        </p:spPr>
+        <p:style>
+          <a:lnRef idx="2">
+            <a:schemeClr val="accent1">
+              <a:shade val="50000"/>
+            </a:schemeClr>
+          </a:lnRef>
+          <a:fillRef idx="1">
+            <a:schemeClr val="accent1"/>
+          </a:fillRef>
+          <a:effectRef idx="0">
+            <a:schemeClr val="accent1"/>
+          </a:effectRef>
+          <a:fontRef idx="minor">
+            <a:schemeClr val="lt1"/>
+          </a:fontRef>
+        </p:style>
+        <p:txBody>
+          <a:bodyPr rtlCol="0" anchor="ctr"/>
+          <a:lstStyle/>
+          <a:p>
+            <a:pPr algn="ctr"/>
+            <a:endParaRPr lang="fr-FR"/>
+          </a:p>
+        </p:txBody>
+      </p:sp>
+    </p:spTree>
+    <p:extLst>
+      <p:ext uri="{BB962C8B-B14F-4D97-AF65-F5344CB8AC3E}">
+        <p14:creationId xmlns:p14="http://schemas.microsoft.com/office/powerpoint/2010/main" val="3480954234"/>
+      </p:ext>
+    </p:extLst>
+  </p:cSld>
+  <p:clrMapOvr>
+    <a:masterClrMapping/>
+  </p:clrMapOvr>
+  <p:timing>
+    <p:tnLst>
+      <p:par>
+        <p:cTn id="1" dur="indefinite" restart="never" nodeType="tmRoot"/>
+      </p:par>
+    </p:tnLst>
+  </p:timing>
+</p:sld>
+</file>
+
+<file path=ppt/slides/slide18.xml><?xml version="1.0" encoding="utf-8"?>
+<p:sld xmlns:a="http://schemas.openxmlformats.org/drawingml/2006/main" xmlns:r="http://schemas.openxmlformats.org/officeDocument/2006/relationships" xmlns:p="http://schemas.openxmlformats.org/presentationml/2006/main">
+  <p:cSld>
+    <p:spTree>
+      <p:nvGrpSpPr>
+        <p:cNvPr id="1" name=""/>
+        <p:cNvGrpSpPr/>
+        <p:nvPr/>
+      </p:nvGrpSpPr>
+      <p:grpSpPr>
+        <a:xfrm>
+          <a:off x="0" y="0"/>
+          <a:ext cx="0" cy="0"/>
+          <a:chOff x="0" y="0"/>
+          <a:chExt cx="0" cy="0"/>
+        </a:xfrm>
+      </p:grpSpPr>
+      <p:sp>
+        <p:nvSpPr>
+          <p:cNvPr id="2" name="Titre 1"/>
+          <p:cNvSpPr>
+            <a:spLocks noGrp="1"/>
+          </p:cNvSpPr>
+          <p:nvPr>
+            <p:ph type="title"/>
+          </p:nvPr>
+        </p:nvSpPr>
+        <p:spPr>
+          <a:xfrm>
+            <a:off x="446856" y="188640"/>
+            <a:ext cx="8373616" cy="796950"/>
+          </a:xfrm>
+        </p:spPr>
+        <p:txBody>
+          <a:bodyPr/>
+          <a:lstStyle/>
+          <a:p>
+            <a:pPr algn="r"/>
+            <a:r>
+              <a:rPr lang="fr-FR" dirty="0" smtClean="0">
+                <a:solidFill>
+                  <a:srgbClr val="336699"/>
+                </a:solidFill>
+              </a:rPr>
+              <a:t>Démonstration</a:t>
+            </a:r>
+            <a:endParaRPr lang="fr-FR" dirty="0">
+              <a:solidFill>
+                <a:srgbClr val="336699"/>
+              </a:solidFill>
+            </a:endParaRPr>
+          </a:p>
+        </p:txBody>
+      </p:sp>
+      <p:sp>
+        <p:nvSpPr>
+          <p:cNvPr id="3" name="Espace réservé du contenu 2"/>
+          <p:cNvSpPr>
+            <a:spLocks noGrp="1"/>
+          </p:cNvSpPr>
+          <p:nvPr>
+            <p:ph idx="1"/>
+          </p:nvPr>
+        </p:nvSpPr>
+        <p:spPr/>
+        <p:txBody>
+          <a:bodyPr/>
+          <a:lstStyle/>
+          <a:p>
+            <a:pPr>
+              <a:buClr>
+                <a:srgbClr val="6699CC"/>
+              </a:buClr>
+            </a:pPr>
+            <a:r>
+              <a:rPr lang="fr-FR" dirty="0" smtClean="0"/>
+              <a:t>Une connexion qui va échouer</a:t>
+            </a:r>
+          </a:p>
+          <a:p>
+            <a:pPr>
+              <a:buClr>
+                <a:srgbClr val="6699CC"/>
+              </a:buClr>
+            </a:pPr>
+            <a:r>
+              <a:rPr lang="fr-FR" dirty="0" smtClean="0"/>
+              <a:t>Connexion au trois interfaces</a:t>
+            </a:r>
+            <a:endParaRPr lang="fr-FR" dirty="0" smtClean="0"/>
+          </a:p>
+          <a:p>
+            <a:pPr>
+              <a:buClr>
+                <a:srgbClr val="6699CC"/>
+              </a:buClr>
+            </a:pPr>
+            <a:endParaRPr lang="fr-FR" dirty="0"/>
+          </a:p>
+        </p:txBody>
+      </p:sp>
+      <p:sp>
+        <p:nvSpPr>
+          <p:cNvPr id="4" name="Espace réservé de la date 3"/>
+          <p:cNvSpPr>
+            <a:spLocks noGrp="1"/>
+          </p:cNvSpPr>
+          <p:nvPr>
+            <p:ph type="dt" sz="half" idx="10"/>
+          </p:nvPr>
+        </p:nvSpPr>
+        <p:spPr/>
+        <p:txBody>
+          <a:bodyPr/>
+          <a:lstStyle/>
+          <a:p>
+            <a:fld id="{A5DF02B5-C084-4573-B9AA-1687D980E5FB}" type="datetime1">
+              <a:rPr lang="fr-FR" smtClean="0"/>
+              <a:t>03/01/2015</a:t>
+            </a:fld>
+            <a:endParaRPr lang="fr-BE"/>
+          </a:p>
+        </p:txBody>
+      </p:sp>
+      <p:sp>
+        <p:nvSpPr>
+          <p:cNvPr id="5" name="Espace réservé du numéro de diapositive 4"/>
+          <p:cNvSpPr>
+            <a:spLocks noGrp="1"/>
+          </p:cNvSpPr>
+          <p:nvPr>
+            <p:ph type="sldNum" sz="quarter" idx="12"/>
+          </p:nvPr>
+        </p:nvSpPr>
+        <p:spPr/>
+        <p:txBody>
+          <a:bodyPr/>
+          <a:lstStyle/>
+          <a:p>
+            <a:fld id="{CF4668DC-857F-487D-BFFA-8C0CA5037977}" type="slidenum">
+              <a:rPr lang="fr-BE" smtClean="0"/>
+              <a:t>18</a:t>
+            </a:fld>
+            <a:endParaRPr lang="fr-BE"/>
+          </a:p>
+        </p:txBody>
+      </p:sp>
+      <p:cxnSp>
+        <p:nvCxnSpPr>
+          <p:cNvPr id="8" name="Connecteur droit 7"/>
+          <p:cNvCxnSpPr/>
+          <p:nvPr/>
+        </p:nvCxnSpPr>
+        <p:spPr>
+          <a:xfrm>
+            <a:off x="467544" y="908720"/>
+            <a:ext cx="8208912" cy="0"/>
+          </a:xfrm>
+          <a:prstGeom prst="line">
+            <a:avLst/>
+          </a:prstGeom>
+        </p:spPr>
+        <p:style>
+          <a:lnRef idx="1">
+            <a:schemeClr val="accent1"/>
+          </a:lnRef>
+          <a:fillRef idx="0">
+            <a:schemeClr val="accent1"/>
+          </a:fillRef>
+          <a:effectRef idx="0">
+            <a:schemeClr val="accent1"/>
+          </a:effectRef>
+          <a:fontRef idx="minor">
+            <a:schemeClr val="tx1"/>
+          </a:fontRef>
+        </p:style>
+      </p:cxnSp>
+      <p:sp>
+        <p:nvSpPr>
+          <p:cNvPr id="10" name="ZoneTexte 9"/>
+          <p:cNvSpPr txBox="1"/>
+          <p:nvPr/>
+        </p:nvSpPr>
+        <p:spPr>
+          <a:xfrm>
+            <a:off x="1763777" y="6309320"/>
+            <a:ext cx="5616446" cy="369332"/>
+          </a:xfrm>
+          <a:prstGeom prst="rect">
+            <a:avLst/>
+          </a:prstGeom>
+          <a:noFill/>
+        </p:spPr>
+        <p:txBody>
+          <a:bodyPr wrap="square" rtlCol="0">
+            <a:spAutoFit/>
+          </a:bodyPr>
+          <a:lstStyle/>
+          <a:p>
+            <a:pPr algn="ctr"/>
+            <a:r>
+              <a:rPr lang="fr-FR" dirty="0" smtClean="0">
+                <a:solidFill>
+                  <a:schemeClr val="bg1">
+                    <a:lumMod val="50000"/>
+                  </a:schemeClr>
+                </a:solidFill>
+              </a:rPr>
+              <a:t>Démonstration du logiciel</a:t>
+            </a:r>
+            <a:endParaRPr lang="fr-FR" dirty="0">
+              <a:solidFill>
+                <a:schemeClr val="bg1">
+                  <a:lumMod val="50000"/>
+                </a:schemeClr>
+              </a:solidFill>
+            </a:endParaRPr>
+          </a:p>
+        </p:txBody>
+      </p:sp>
+    </p:spTree>
+    <p:extLst>
+      <p:ext uri="{BB962C8B-B14F-4D97-AF65-F5344CB8AC3E}">
+        <p14:creationId xmlns:p14="http://schemas.microsoft.com/office/powerpoint/2010/main" val="4128894042"/>
+      </p:ext>
+    </p:extLst>
+  </p:cSld>
+  <p:clrMapOvr>
+    <a:masterClrMapping/>
+  </p:clrMapOvr>
+  <p:timing>
+    <p:tnLst>
+      <p:par>
+        <p:cTn id="1" dur="indefinite" restart="never" nodeType="tmRoot"/>
+      </p:par>
+    </p:tnLst>
+  </p:timing>
+</p:sld>
+</file>
+
+<file path=ppt/slides/slide19.xml><?xml version="1.0" encoding="utf-8"?>
+<p:sld xmlns:a="http://schemas.openxmlformats.org/drawingml/2006/main" xmlns:r="http://schemas.openxmlformats.org/officeDocument/2006/relationships" xmlns:p="http://schemas.openxmlformats.org/presentationml/2006/main">
+  <p:cSld>
+    <p:spTree>
+      <p:nvGrpSpPr>
+        <p:cNvPr id="1" name=""/>
+        <p:cNvGrpSpPr/>
+        <p:nvPr/>
+      </p:nvGrpSpPr>
+      <p:grpSpPr>
+        <a:xfrm>
+          <a:off x="0" y="0"/>
+          <a:ext cx="0" cy="0"/>
+          <a:chOff x="0" y="0"/>
+          <a:chExt cx="0" cy="0"/>
+        </a:xfrm>
+      </p:grpSpPr>
+      <p:sp>
+        <p:nvSpPr>
+          <p:cNvPr id="5" name="Espace réservé du numéro de diapositive 4"/>
+          <p:cNvSpPr>
+            <a:spLocks noGrp="1"/>
+          </p:cNvSpPr>
+          <p:nvPr>
+            <p:ph type="sldNum" sz="quarter" idx="12"/>
+          </p:nvPr>
+        </p:nvSpPr>
+        <p:spPr/>
+        <p:txBody>
+          <a:bodyPr/>
+          <a:lstStyle/>
+          <a:p>
+            <a:fld id="{CF4668DC-857F-487D-BFFA-8C0CA5037977}" type="slidenum">
+              <a:rPr lang="fr-BE" smtClean="0"/>
+              <a:t>19</a:t>
             </a:fld>
             <a:endParaRPr lang="fr-BE"/>
           </a:p>
@@ -16210,7 +17223,7 @@
                   <a:schemeClr val="bg1"/>
                 </a:solidFill>
               </a:rPr>
-              <a:t>30/12/2014</a:t>
+              <a:t>03/01/2015</a:t>
             </a:fld>
             <a:endParaRPr lang="fr-BE" sz="2000" dirty="0">
               <a:solidFill>
@@ -16383,7 +17396,7 @@
           <a:p>
             <a:fld id="{A5DF02B5-C084-4573-B9AA-1687D980E5FB}" type="datetime1">
               <a:rPr lang="fr-FR" smtClean="0"/>
-              <a:t>30/12/2014</a:t>
+              <a:t>03/01/2015</a:t>
             </a:fld>
             <a:endParaRPr lang="fr-BE"/>
           </a:p>
@@ -16575,7 +17588,7 @@
           <a:p>
             <a:fld id="{C2D65230-C684-41AF-AA0D-72F719444CFB}" type="datetime1">
               <a:rPr lang="fr-FR" smtClean="0"/>
-              <a:t>30/12/2014</a:t>
+              <a:t>03/01/2015</a:t>
             </a:fld>
             <a:endParaRPr lang="fr-BE"/>
           </a:p>
@@ -16711,7 +17724,7 @@
           <a:p>
             <a:pPr algn="r"/>
             <a:r>
-              <a:rPr lang="fr-FR" dirty="0" smtClean="0">
+              <a:rPr lang="fr-FR" smtClean="0">
                 <a:solidFill>
                   <a:srgbClr val="336699"/>
                 </a:solidFill>
@@ -16723,30 +17736,6 @@
                 <a:srgbClr val="336699"/>
               </a:solidFill>
             </a:endParaRPr>
-          </a:p>
-        </p:txBody>
-      </p:sp>
-      <p:sp>
-        <p:nvSpPr>
-          <p:cNvPr id="3" name="Espace réservé du contenu 2"/>
-          <p:cNvSpPr>
-            <a:spLocks noGrp="1"/>
-          </p:cNvSpPr>
-          <p:nvPr>
-            <p:ph idx="1"/>
-          </p:nvPr>
-        </p:nvSpPr>
-        <p:spPr/>
-        <p:txBody>
-          <a:bodyPr/>
-          <a:lstStyle/>
-          <a:p>
-            <a:pPr>
-              <a:buClr>
-                <a:srgbClr val="6699CC"/>
-              </a:buClr>
-            </a:pPr>
-            <a:endParaRPr lang="fr-FR" dirty="0"/>
           </a:p>
         </p:txBody>
       </p:sp>
@@ -16767,7 +17756,7 @@
           <a:p>
             <a:fld id="{A5DF02B5-C084-4573-B9AA-1687D980E5FB}" type="datetime1">
               <a:rPr lang="fr-FR" smtClean="0"/>
-              <a:t>30/12/2014</a:t>
+              <a:t>03/01/2015</a:t>
             </a:fld>
             <a:endParaRPr lang="fr-BE"/>
           </a:p>
@@ -16869,10 +17858,54 @@
           </a:p>
         </p:txBody>
       </p:sp>
+      <p:sp>
+        <p:nvSpPr>
+          <p:cNvPr id="19" name="Espace réservé du contenu 10"/>
+          <p:cNvSpPr>
+            <a:spLocks noGrp="1"/>
+          </p:cNvSpPr>
+          <p:nvPr>
+            <p:ph idx="1"/>
+          </p:nvPr>
+        </p:nvSpPr>
+        <p:spPr>
+          <a:xfrm>
+            <a:off x="457200" y="1600200"/>
+            <a:ext cx="8229600" cy="4525963"/>
+          </a:xfrm>
+        </p:spPr>
+        <p:txBody>
+          <a:bodyPr/>
+          <a:lstStyle/>
+          <a:p>
+            <a:pPr>
+              <a:buClr>
+                <a:srgbClr val="6699CC"/>
+              </a:buClr>
+            </a:pPr>
+            <a:r>
+              <a:rPr lang="fr-FR" dirty="0" smtClean="0"/>
+              <a:t>Répondre au besoin du client</a:t>
+            </a:r>
+          </a:p>
+          <a:p>
+            <a:pPr lvl="1">
+              <a:buClr>
+                <a:srgbClr val="6699CC"/>
+              </a:buClr>
+            </a:pPr>
+            <a:r>
+              <a:rPr lang="fr-FR" dirty="0" smtClean="0"/>
+              <a:t>Gestion selon trois postes</a:t>
+            </a:r>
+            <a:endParaRPr lang="fr-FR" dirty="0"/>
+          </a:p>
+        </p:txBody>
+      </p:sp>
     </p:spTree>
     <p:extLst>
       <p:ext uri="{BB962C8B-B14F-4D97-AF65-F5344CB8AC3E}">
-        <p14:creationId xmlns:p14="http://schemas.microsoft.com/office/powerpoint/2010/main" val="3253840258"/>
+        <p14:creationId xmlns:p14="http://schemas.microsoft.com/office/powerpoint/2010/main" val="2939050648"/>
       </p:ext>
     </p:extLst>
   </p:cSld>
@@ -16933,7 +17966,7 @@
                   <a:srgbClr val="336699"/>
                 </a:solidFill>
               </a:rPr>
-              <a:t>Les Interfaces</a:t>
+              <a:t>Présentation du logiciel</a:t>
             </a:r>
             <a:endParaRPr lang="fr-FR" dirty="0">
               <a:solidFill>
@@ -16943,31 +17976,6 @@
           </a:p>
         </p:txBody>
       </p:sp>
-      <p:graphicFrame>
-        <p:nvGraphicFramePr>
-          <p:cNvPr id="7" name="Espace réservé du contenu 6"/>
-          <p:cNvGraphicFramePr>
-            <a:graphicFrameLocks noGrp="1"/>
-          </p:cNvGraphicFramePr>
-          <p:nvPr>
-            <p:ph idx="1"/>
-            <p:extLst>
-              <p:ext uri="{D42A27DB-BD31-4B8C-83A1-F6EECF244321}">
-                <p14:modId xmlns:p14="http://schemas.microsoft.com/office/powerpoint/2010/main" val="1837951338"/>
-              </p:ext>
-            </p:extLst>
-          </p:nvPr>
-        </p:nvGraphicFramePr>
-        <p:xfrm>
-          <a:off x="446856" y="1124744"/>
-          <a:ext cx="8229600" cy="4525963"/>
-        </p:xfrm>
-        <a:graphic>
-          <a:graphicData uri="http://schemas.openxmlformats.org/drawingml/2006/diagram">
-            <dgm:relIds xmlns:dgm="http://schemas.openxmlformats.org/drawingml/2006/diagram" xmlns:r="http://schemas.openxmlformats.org/officeDocument/2006/relationships" r:dm="rId3" r:lo="rId4" r:qs="rId5" r:cs="rId6"/>
-          </a:graphicData>
-        </a:graphic>
-      </p:graphicFrame>
       <p:sp>
         <p:nvSpPr>
           <p:cNvPr id="4" name="Espace réservé de la date 3"/>
@@ -16985,7 +17993,7 @@
           <a:p>
             <a:fld id="{A5DF02B5-C084-4573-B9AA-1687D980E5FB}" type="datetime1">
               <a:rPr lang="fr-FR" smtClean="0"/>
-              <a:t>30/12/2014</a:t>
+              <a:t>03/01/2015</a:t>
             </a:fld>
             <a:endParaRPr lang="fr-BE"/>
           </a:p>
@@ -17087,128 +18095,388 @@
           </a:p>
         </p:txBody>
       </p:sp>
-      <p:sp>
-        <p:nvSpPr>
-          <p:cNvPr id="11" name="ZoneTexte 10"/>
-          <p:cNvSpPr txBox="1"/>
+      <p:pic>
+        <p:nvPicPr>
+          <p:cNvPr id="1026" name="Picture 2"/>
+          <p:cNvPicPr>
+            <a:picLocks noChangeAspect="1" noChangeArrowheads="1"/>
+          </p:cNvPicPr>
           <p:nvPr/>
-        </p:nvSpPr>
-        <p:spPr>
+        </p:nvPicPr>
+        <p:blipFill>
+          <a:blip r:embed="rId2">
+            <a:extLst>
+              <a:ext uri="{28A0092B-C50C-407E-A947-70E740481C1C}">
+                <a14:useLocalDpi xmlns:a14="http://schemas.microsoft.com/office/drawing/2010/main" val="0"/>
+              </a:ext>
+            </a:extLst>
+          </a:blip>
+          <a:srcRect/>
+          <a:stretch>
+            <a:fillRect/>
+          </a:stretch>
+        </p:blipFill>
+        <p:spPr bwMode="auto">
           <a:xfrm>
-            <a:off x="1043608" y="5184000"/>
-            <a:ext cx="1800200" cy="369332"/>
+            <a:off x="6703014" y="2515396"/>
+            <a:ext cx="1938439" cy="1457586"/>
           </a:xfrm>
           <a:prstGeom prst="rect">
             <a:avLst/>
           </a:prstGeom>
           <a:noFill/>
+          <a:ln>
+            <a:noFill/>
+          </a:ln>
+          <a:extLst>
+            <a:ext uri="{909E8E84-426E-40DD-AFC4-6F175D3DCCD1}">
+              <a14:hiddenFill xmlns:a14="http://schemas.microsoft.com/office/drawing/2010/main">
+                <a:solidFill>
+                  <a:schemeClr val="accent1"/>
+                </a:solidFill>
+              </a14:hiddenFill>
+            </a:ext>
+            <a:ext uri="{91240B29-F687-4F45-9708-019B960494DF}">
+              <a14:hiddenLine xmlns:a14="http://schemas.microsoft.com/office/drawing/2010/main" w="9525">
+                <a:solidFill>
+                  <a:schemeClr val="tx1"/>
+                </a:solidFill>
+                <a:miter lim="800000"/>
+                <a:headEnd/>
+                <a:tailEnd/>
+              </a14:hiddenLine>
+            </a:ext>
+          </a:extLst>
         </p:spPr>
-        <p:txBody>
-          <a:bodyPr wrap="square" rtlCol="0">
-            <a:spAutoFit/>
-          </a:bodyPr>
-          <a:lstStyle/>
-          <a:p>
-            <a:r>
-              <a:rPr lang="fr-FR" dirty="0" smtClean="0"/>
-              <a:t>=&gt; Manager</a:t>
-            </a:r>
-            <a:endParaRPr lang="fr-FR" dirty="0"/>
-          </a:p>
-        </p:txBody>
-      </p:sp>
-      <p:sp>
-        <p:nvSpPr>
-          <p:cNvPr id="12" name="ZoneTexte 11"/>
-          <p:cNvSpPr txBox="1"/>
+      </p:pic>
+      <p:pic>
+        <p:nvPicPr>
+          <p:cNvPr id="1027" name="Picture 3"/>
+          <p:cNvPicPr>
+            <a:picLocks noChangeAspect="1" noChangeArrowheads="1"/>
+          </p:cNvPicPr>
           <p:nvPr/>
-        </p:nvSpPr>
-        <p:spPr>
+        </p:nvPicPr>
+        <p:blipFill>
+          <a:blip r:embed="rId3">
+            <a:extLst>
+              <a:ext uri="{28A0092B-C50C-407E-A947-70E740481C1C}">
+                <a14:useLocalDpi xmlns:a14="http://schemas.microsoft.com/office/drawing/2010/main" val="0"/>
+              </a:ext>
+            </a:extLst>
+          </a:blip>
+          <a:srcRect/>
+          <a:stretch>
+            <a:fillRect/>
+          </a:stretch>
+        </p:blipFill>
+        <p:spPr bwMode="auto">
           <a:xfrm>
-            <a:off x="3923928" y="5184000"/>
-            <a:ext cx="2160240" cy="646331"/>
+            <a:off x="3973588" y="2812916"/>
+            <a:ext cx="1506015" cy="1249672"/>
           </a:xfrm>
           <a:prstGeom prst="rect">
             <a:avLst/>
           </a:prstGeom>
           <a:noFill/>
+          <a:ln>
+            <a:noFill/>
+          </a:ln>
+          <a:extLst>
+            <a:ext uri="{909E8E84-426E-40DD-AFC4-6F175D3DCCD1}">
+              <a14:hiddenFill xmlns:a14="http://schemas.microsoft.com/office/drawing/2010/main">
+                <a:solidFill>
+                  <a:schemeClr val="accent1"/>
+                </a:solidFill>
+              </a14:hiddenFill>
+            </a:ext>
+            <a:ext uri="{91240B29-F687-4F45-9708-019B960494DF}">
+              <a14:hiddenLine xmlns:a14="http://schemas.microsoft.com/office/drawing/2010/main" w="9525">
+                <a:solidFill>
+                  <a:schemeClr val="tx1"/>
+                </a:solidFill>
+                <a:miter lim="800000"/>
+                <a:headEnd/>
+                <a:tailEnd/>
+              </a14:hiddenLine>
+            </a:ext>
+          </a:extLst>
         </p:spPr>
-        <p:txBody>
-          <a:bodyPr wrap="square" rtlCol="0">
-            <a:spAutoFit/>
-          </a:bodyPr>
-          <a:lstStyle/>
-          <a:p>
-            <a:pPr marL="285750" indent="-285750">
-              <a:buFont typeface="Symbol"/>
-              <a:buChar char="Þ"/>
-            </a:pPr>
-            <a:r>
-              <a:rPr lang="fr-FR" dirty="0" smtClean="0"/>
-              <a:t>Manager</a:t>
-            </a:r>
-          </a:p>
-          <a:p>
-            <a:pPr marL="285750" indent="-285750">
-              <a:buFont typeface="Symbol"/>
-              <a:buChar char="Þ"/>
-            </a:pPr>
-            <a:r>
-              <a:rPr lang="fr-FR" dirty="0" smtClean="0"/>
-              <a:t>Employé Cuisson</a:t>
-            </a:r>
-            <a:endParaRPr lang="fr-FR" dirty="0"/>
-          </a:p>
-        </p:txBody>
-      </p:sp>
-      <p:sp>
-        <p:nvSpPr>
-          <p:cNvPr id="13" name="ZoneTexte 12"/>
-          <p:cNvSpPr txBox="1"/>
+      </p:pic>
+      <p:pic>
+        <p:nvPicPr>
+          <p:cNvPr id="1028" name="Picture 4"/>
+          <p:cNvPicPr>
+            <a:picLocks noChangeAspect="1" noChangeArrowheads="1"/>
+          </p:cNvPicPr>
           <p:nvPr/>
-        </p:nvSpPr>
-        <p:spPr>
+        </p:nvPicPr>
+        <p:blipFill>
+          <a:blip r:embed="rId4">
+            <a:extLst>
+              <a:ext uri="{28A0092B-C50C-407E-A947-70E740481C1C}">
+                <a14:useLocalDpi xmlns:a14="http://schemas.microsoft.com/office/drawing/2010/main" val="0"/>
+              </a:ext>
+            </a:extLst>
+          </a:blip>
+          <a:srcRect/>
+          <a:stretch>
+            <a:fillRect/>
+          </a:stretch>
+        </p:blipFill>
+        <p:spPr bwMode="auto">
           <a:xfrm>
-            <a:off x="6711317" y="5184000"/>
-            <a:ext cx="1316066" cy="646331"/>
+            <a:off x="5220072" y="3099361"/>
+            <a:ext cx="1800225" cy="180975"/>
           </a:xfrm>
           <a:prstGeom prst="rect">
             <a:avLst/>
           </a:prstGeom>
           <a:noFill/>
+          <a:ln>
+            <a:noFill/>
+          </a:ln>
+          <a:extLst>
+            <a:ext uri="{909E8E84-426E-40DD-AFC4-6F175D3DCCD1}">
+              <a14:hiddenFill xmlns:a14="http://schemas.microsoft.com/office/drawing/2010/main">
+                <a:solidFill>
+                  <a:schemeClr val="accent1"/>
+                </a:solidFill>
+              </a14:hiddenFill>
+            </a:ext>
+            <a:ext uri="{91240B29-F687-4F45-9708-019B960494DF}">
+              <a14:hiddenLine xmlns:a14="http://schemas.microsoft.com/office/drawing/2010/main" w="9525">
+                <a:solidFill>
+                  <a:schemeClr val="tx1"/>
+                </a:solidFill>
+                <a:miter lim="800000"/>
+                <a:headEnd/>
+                <a:tailEnd/>
+              </a14:hiddenLine>
+            </a:ext>
+          </a:extLst>
         </p:spPr>
-        <p:txBody>
-          <a:bodyPr wrap="none" rtlCol="0">
-            <a:spAutoFit/>
-          </a:bodyPr>
-          <a:lstStyle/>
-          <a:p>
-            <a:pPr marL="285750" indent="-285750">
-              <a:buFont typeface="Symbol"/>
-              <a:buChar char="Þ"/>
-            </a:pPr>
-            <a:r>
-              <a:rPr lang="fr-FR" dirty="0" smtClean="0"/>
-              <a:t>Manager</a:t>
-            </a:r>
-          </a:p>
-          <a:p>
-            <a:pPr marL="285750" indent="-285750">
-              <a:buFont typeface="Symbol"/>
-              <a:buChar char="Þ"/>
-            </a:pPr>
-            <a:r>
-              <a:rPr lang="fr-FR" dirty="0" smtClean="0"/>
-              <a:t>Vendeur</a:t>
-            </a:r>
-            <a:endParaRPr lang="fr-FR" dirty="0"/>
-          </a:p>
-        </p:txBody>
-      </p:sp>
+      </p:pic>
+      <p:pic>
+        <p:nvPicPr>
+          <p:cNvPr id="1029" name="Picture 5"/>
+          <p:cNvPicPr>
+            <a:picLocks noChangeAspect="1" noChangeArrowheads="1"/>
+          </p:cNvPicPr>
+          <p:nvPr/>
+        </p:nvPicPr>
+        <p:blipFill>
+          <a:blip r:embed="rId4">
+            <a:extLst>
+              <a:ext uri="{28A0092B-C50C-407E-A947-70E740481C1C}">
+                <a14:useLocalDpi xmlns:a14="http://schemas.microsoft.com/office/drawing/2010/main" val="0"/>
+              </a:ext>
+            </a:extLst>
+          </a:blip>
+          <a:srcRect/>
+          <a:stretch>
+            <a:fillRect/>
+          </a:stretch>
+        </p:blipFill>
+        <p:spPr bwMode="auto">
+          <a:xfrm rot="10800000">
+            <a:off x="5244226" y="3348147"/>
+            <a:ext cx="1800225" cy="180975"/>
+          </a:xfrm>
+          <a:prstGeom prst="rect">
+            <a:avLst/>
+          </a:prstGeom>
+          <a:noFill/>
+          <a:ln>
+            <a:noFill/>
+          </a:ln>
+          <a:extLst>
+            <a:ext uri="{909E8E84-426E-40DD-AFC4-6F175D3DCCD1}">
+              <a14:hiddenFill xmlns:a14="http://schemas.microsoft.com/office/drawing/2010/main">
+                <a:solidFill>
+                  <a:schemeClr val="accent1"/>
+                </a:solidFill>
+              </a14:hiddenFill>
+            </a:ext>
+            <a:ext uri="{91240B29-F687-4F45-9708-019B960494DF}">
+              <a14:hiddenLine xmlns:a14="http://schemas.microsoft.com/office/drawing/2010/main" w="9525">
+                <a:solidFill>
+                  <a:schemeClr val="tx1"/>
+                </a:solidFill>
+                <a:miter lim="800000"/>
+                <a:headEnd/>
+                <a:tailEnd/>
+              </a14:hiddenLine>
+            </a:ext>
+          </a:extLst>
+        </p:spPr>
+      </p:pic>
+      <p:pic>
+        <p:nvPicPr>
+          <p:cNvPr id="1031" name="Picture 7"/>
+          <p:cNvPicPr>
+            <a:picLocks noChangeAspect="1" noChangeArrowheads="1"/>
+          </p:cNvPicPr>
+          <p:nvPr/>
+        </p:nvPicPr>
+        <p:blipFill>
+          <a:blip r:embed="rId5">
+            <a:extLst>
+              <a:ext uri="{28A0092B-C50C-407E-A947-70E740481C1C}">
+                <a14:useLocalDpi xmlns:a14="http://schemas.microsoft.com/office/drawing/2010/main" val="0"/>
+              </a:ext>
+            </a:extLst>
+          </a:blip>
+          <a:srcRect/>
+          <a:stretch>
+            <a:fillRect/>
+          </a:stretch>
+        </p:blipFill>
+        <p:spPr bwMode="auto">
+          <a:xfrm>
+            <a:off x="490444" y="2727888"/>
+            <a:ext cx="1781175" cy="1685925"/>
+          </a:xfrm>
+          <a:prstGeom prst="rect">
+            <a:avLst/>
+          </a:prstGeom>
+          <a:noFill/>
+          <a:ln>
+            <a:noFill/>
+          </a:ln>
+          <a:extLst>
+            <a:ext uri="{909E8E84-426E-40DD-AFC4-6F175D3DCCD1}">
+              <a14:hiddenFill xmlns:a14="http://schemas.microsoft.com/office/drawing/2010/main">
+                <a:solidFill>
+                  <a:schemeClr val="accent1"/>
+                </a:solidFill>
+              </a14:hiddenFill>
+            </a:ext>
+            <a:ext uri="{91240B29-F687-4F45-9708-019B960494DF}">
+              <a14:hiddenLine xmlns:a14="http://schemas.microsoft.com/office/drawing/2010/main" w="9525">
+                <a:solidFill>
+                  <a:schemeClr val="tx1"/>
+                </a:solidFill>
+                <a:miter lim="800000"/>
+                <a:headEnd/>
+                <a:tailEnd/>
+              </a14:hiddenLine>
+            </a:ext>
+          </a:extLst>
+        </p:spPr>
+      </p:pic>
+      <p:pic>
+        <p:nvPicPr>
+          <p:cNvPr id="14" name="Picture 4"/>
+          <p:cNvPicPr>
+            <a:picLocks noChangeAspect="1" noChangeArrowheads="1"/>
+          </p:cNvPicPr>
+          <p:nvPr/>
+        </p:nvPicPr>
+        <p:blipFill>
+          <a:blip r:embed="rId4">
+            <a:extLst>
+              <a:ext uri="{28A0092B-C50C-407E-A947-70E740481C1C}">
+                <a14:useLocalDpi xmlns:a14="http://schemas.microsoft.com/office/drawing/2010/main" val="0"/>
+              </a:ext>
+            </a:extLst>
+          </a:blip>
+          <a:srcRect/>
+          <a:stretch>
+            <a:fillRect/>
+          </a:stretch>
+        </p:blipFill>
+        <p:spPr bwMode="auto">
+          <a:xfrm>
+            <a:off x="2287643" y="3099361"/>
+            <a:ext cx="1800225" cy="180975"/>
+          </a:xfrm>
+          <a:prstGeom prst="rect">
+            <a:avLst/>
+          </a:prstGeom>
+          <a:noFill/>
+          <a:ln>
+            <a:noFill/>
+          </a:ln>
+          <a:extLst>
+            <a:ext uri="{909E8E84-426E-40DD-AFC4-6F175D3DCCD1}">
+              <a14:hiddenFill xmlns:a14="http://schemas.microsoft.com/office/drawing/2010/main">
+                <a:solidFill>
+                  <a:schemeClr val="accent1"/>
+                </a:solidFill>
+              </a14:hiddenFill>
+            </a:ext>
+            <a:ext uri="{91240B29-F687-4F45-9708-019B960494DF}">
+              <a14:hiddenLine xmlns:a14="http://schemas.microsoft.com/office/drawing/2010/main" w="9525">
+                <a:solidFill>
+                  <a:schemeClr val="tx1"/>
+                </a:solidFill>
+                <a:miter lim="800000"/>
+                <a:headEnd/>
+                <a:tailEnd/>
+              </a14:hiddenLine>
+            </a:ext>
+          </a:extLst>
+        </p:spPr>
+      </p:pic>
+      <p:pic>
+        <p:nvPicPr>
+          <p:cNvPr id="15" name="Picture 5"/>
+          <p:cNvPicPr>
+            <a:picLocks noChangeAspect="1" noChangeArrowheads="1"/>
+          </p:cNvPicPr>
+          <p:nvPr/>
+        </p:nvPicPr>
+        <p:blipFill>
+          <a:blip r:embed="rId4">
+            <a:extLst>
+              <a:ext uri="{28A0092B-C50C-407E-A947-70E740481C1C}">
+                <a14:useLocalDpi xmlns:a14="http://schemas.microsoft.com/office/drawing/2010/main" val="0"/>
+              </a:ext>
+            </a:extLst>
+          </a:blip>
+          <a:srcRect/>
+          <a:stretch>
+            <a:fillRect/>
+          </a:stretch>
+        </p:blipFill>
+        <p:spPr bwMode="auto">
+          <a:xfrm rot="10800000">
+            <a:off x="2263120" y="3348146"/>
+            <a:ext cx="1800225" cy="180975"/>
+          </a:xfrm>
+          <a:prstGeom prst="rect">
+            <a:avLst/>
+          </a:prstGeom>
+          <a:noFill/>
+          <a:ln>
+            <a:noFill/>
+          </a:ln>
+          <a:extLst>
+            <a:ext uri="{909E8E84-426E-40DD-AFC4-6F175D3DCCD1}">
+              <a14:hiddenFill xmlns:a14="http://schemas.microsoft.com/office/drawing/2010/main">
+                <a:solidFill>
+                  <a:schemeClr val="accent1"/>
+                </a:solidFill>
+              </a14:hiddenFill>
+            </a:ext>
+            <a:ext uri="{91240B29-F687-4F45-9708-019B960494DF}">
+              <a14:hiddenLine xmlns:a14="http://schemas.microsoft.com/office/drawing/2010/main" w="9525">
+                <a:solidFill>
+                  <a:schemeClr val="tx1"/>
+                </a:solidFill>
+                <a:miter lim="800000"/>
+                <a:headEnd/>
+                <a:tailEnd/>
+              </a14:hiddenLine>
+            </a:ext>
+          </a:extLst>
+        </p:spPr>
+      </p:pic>
     </p:spTree>
     <p:extLst>
       <p:ext uri="{BB962C8B-B14F-4D97-AF65-F5344CB8AC3E}">
-        <p14:creationId xmlns:p14="http://schemas.microsoft.com/office/powerpoint/2010/main" val="2873897975"/>
+        <p14:creationId xmlns:p14="http://schemas.microsoft.com/office/powerpoint/2010/main" val="3253840258"/>
       </p:ext>
     </p:extLst>
   </p:cSld>
@@ -17269,7 +18537,7 @@
                   <a:srgbClr val="336699"/>
                 </a:solidFill>
               </a:rPr>
-              <a:t>L’interface manager</a:t>
+              <a:t>Les Interfaces</a:t>
             </a:r>
             <a:endParaRPr lang="fr-FR" dirty="0">
               <a:solidFill>
@@ -17279,6 +18547,31 @@
           </a:p>
         </p:txBody>
       </p:sp>
+      <p:graphicFrame>
+        <p:nvGraphicFramePr>
+          <p:cNvPr id="7" name="Espace réservé du contenu 6"/>
+          <p:cNvGraphicFramePr>
+            <a:graphicFrameLocks noGrp="1"/>
+          </p:cNvGraphicFramePr>
+          <p:nvPr>
+            <p:ph idx="1"/>
+            <p:extLst>
+              <p:ext uri="{D42A27DB-BD31-4B8C-83A1-F6EECF244321}">
+                <p14:modId xmlns:p14="http://schemas.microsoft.com/office/powerpoint/2010/main" val="1837951338"/>
+              </p:ext>
+            </p:extLst>
+          </p:nvPr>
+        </p:nvGraphicFramePr>
+        <p:xfrm>
+          <a:off x="446856" y="1124744"/>
+          <a:ext cx="8229600" cy="4525963"/>
+        </p:xfrm>
+        <a:graphic>
+          <a:graphicData uri="http://schemas.openxmlformats.org/drawingml/2006/diagram">
+            <dgm:relIds xmlns:dgm="http://schemas.openxmlformats.org/drawingml/2006/diagram" xmlns:r="http://schemas.openxmlformats.org/officeDocument/2006/relationships" r:dm="rId3" r:lo="rId4" r:qs="rId5" r:cs="rId6"/>
+          </a:graphicData>
+        </a:graphic>
+      </p:graphicFrame>
       <p:sp>
         <p:nvSpPr>
           <p:cNvPr id="4" name="Espace réservé de la date 3"/>
@@ -17296,7 +18589,7 @@
           <a:p>
             <a:fld id="{A5DF02B5-C084-4573-B9AA-1687D980E5FB}" type="datetime1">
               <a:rPr lang="fr-FR" smtClean="0"/>
-              <a:t>30/12/2014</a:t>
+              <a:t>03/01/2015</a:t>
             </a:fld>
             <a:endParaRPr lang="fr-BE"/>
           </a:p>
@@ -17400,29 +18693,118 @@
       </p:sp>
       <p:sp>
         <p:nvSpPr>
-          <p:cNvPr id="3" name="Espace réservé du contenu 2"/>
-          <p:cNvSpPr>
-            <a:spLocks noGrp="1"/>
-          </p:cNvSpPr>
-          <p:nvPr>
-            <p:ph idx="1"/>
-          </p:nvPr>
+          <p:cNvPr id="11" name="ZoneTexte 10"/>
+          <p:cNvSpPr txBox="1"/>
+          <p:nvPr/>
         </p:nvSpPr>
         <p:spPr>
           <a:xfrm>
-            <a:off x="457200" y="1600200"/>
-            <a:ext cx="8229600" cy="4421087"/>
+            <a:off x="1043608" y="5184000"/>
+            <a:ext cx="1800200" cy="369332"/>
           </a:xfrm>
+          <a:prstGeom prst="rect">
+            <a:avLst/>
+          </a:prstGeom>
+          <a:noFill/>
         </p:spPr>
         <p:txBody>
-          <a:bodyPr/>
+          <a:bodyPr wrap="square" rtlCol="0">
+            <a:spAutoFit/>
+          </a:bodyPr>
           <a:lstStyle/>
           <a:p>
-            <a:pPr>
-              <a:buClr>
-                <a:srgbClr val="6699CC"/>
-              </a:buClr>
+            <a:r>
+              <a:rPr lang="fr-FR" dirty="0" smtClean="0"/>
+              <a:t>=&gt; Manager</a:t>
+            </a:r>
+            <a:endParaRPr lang="fr-FR" dirty="0"/>
+          </a:p>
+        </p:txBody>
+      </p:sp>
+      <p:sp>
+        <p:nvSpPr>
+          <p:cNvPr id="12" name="ZoneTexte 11"/>
+          <p:cNvSpPr txBox="1"/>
+          <p:nvPr/>
+        </p:nvSpPr>
+        <p:spPr>
+          <a:xfrm>
+            <a:off x="3923928" y="5184000"/>
+            <a:ext cx="2160240" cy="646331"/>
+          </a:xfrm>
+          <a:prstGeom prst="rect">
+            <a:avLst/>
+          </a:prstGeom>
+          <a:noFill/>
+        </p:spPr>
+        <p:txBody>
+          <a:bodyPr wrap="square" rtlCol="0">
+            <a:spAutoFit/>
+          </a:bodyPr>
+          <a:lstStyle/>
+          <a:p>
+            <a:pPr marL="285750" indent="-285750">
+              <a:buFont typeface="Symbol"/>
+              <a:buChar char="Þ"/>
             </a:pPr>
+            <a:r>
+              <a:rPr lang="fr-FR" dirty="0" smtClean="0"/>
+              <a:t>Manager</a:t>
+            </a:r>
+          </a:p>
+          <a:p>
+            <a:pPr marL="285750" indent="-285750">
+              <a:buFont typeface="Symbol"/>
+              <a:buChar char="Þ"/>
+            </a:pPr>
+            <a:r>
+              <a:rPr lang="fr-FR" dirty="0" smtClean="0"/>
+              <a:t>Employé Cuisson</a:t>
+            </a:r>
+            <a:endParaRPr lang="fr-FR" dirty="0"/>
+          </a:p>
+        </p:txBody>
+      </p:sp>
+      <p:sp>
+        <p:nvSpPr>
+          <p:cNvPr id="13" name="ZoneTexte 12"/>
+          <p:cNvSpPr txBox="1"/>
+          <p:nvPr/>
+        </p:nvSpPr>
+        <p:spPr>
+          <a:xfrm>
+            <a:off x="6711317" y="5184000"/>
+            <a:ext cx="1316066" cy="646331"/>
+          </a:xfrm>
+          <a:prstGeom prst="rect">
+            <a:avLst/>
+          </a:prstGeom>
+          <a:noFill/>
+        </p:spPr>
+        <p:txBody>
+          <a:bodyPr wrap="none" rtlCol="0">
+            <a:spAutoFit/>
+          </a:bodyPr>
+          <a:lstStyle/>
+          <a:p>
+            <a:pPr marL="285750" indent="-285750">
+              <a:buFont typeface="Symbol"/>
+              <a:buChar char="Þ"/>
+            </a:pPr>
+            <a:r>
+              <a:rPr lang="fr-FR" dirty="0" smtClean="0"/>
+              <a:t>Manager</a:t>
+            </a:r>
+          </a:p>
+          <a:p>
+            <a:pPr marL="285750" indent="-285750">
+              <a:buFont typeface="Symbol"/>
+              <a:buChar char="Þ"/>
+            </a:pPr>
+            <a:r>
+              <a:rPr lang="fr-FR" dirty="0" smtClean="0"/>
+              <a:t>Vendeur</a:t>
+            </a:r>
             <a:endParaRPr lang="fr-FR" dirty="0"/>
           </a:p>
         </p:txBody>
@@ -17430,7 +18812,7 @@
     </p:spTree>
     <p:extLst>
       <p:ext uri="{BB962C8B-B14F-4D97-AF65-F5344CB8AC3E}">
-        <p14:creationId xmlns:p14="http://schemas.microsoft.com/office/powerpoint/2010/main" val="2219268645"/>
+        <p14:creationId xmlns:p14="http://schemas.microsoft.com/office/powerpoint/2010/main" val="2873897975"/>
       </p:ext>
     </p:extLst>
   </p:cSld>
@@ -17491,7 +18873,7 @@
                   <a:srgbClr val="336699"/>
                 </a:solidFill>
               </a:rPr>
-              <a:t>L’interface Employé de cuisson</a:t>
+              <a:t>L’interface manager</a:t>
             </a:r>
             <a:endParaRPr lang="fr-FR" dirty="0">
               <a:solidFill>
@@ -17518,7 +18900,7 @@
           <a:p>
             <a:fld id="{A5DF02B5-C084-4573-B9AA-1687D980E5FB}" type="datetime1">
               <a:rPr lang="fr-FR" smtClean="0"/>
-              <a:t>30/12/2014</a:t>
+              <a:t>03/01/2015</a:t>
             </a:fld>
             <a:endParaRPr lang="fr-BE"/>
           </a:p>
@@ -17633,66 +19015,60 @@
         <p:spPr>
           <a:xfrm>
             <a:off x="457200" y="1600200"/>
-            <a:ext cx="8229600" cy="4349079"/>
+            <a:ext cx="8229600" cy="4421087"/>
           </a:xfrm>
         </p:spPr>
         <p:txBody>
           <a:bodyPr/>
           <a:lstStyle/>
           <a:p>
+            <a:pPr lvl="0"/>
+            <a:r>
+              <a:rPr lang="fr-FR" dirty="0"/>
+              <a:t>Organisée en 3 onglets : gestion des stocks, configuration et statistique.</a:t>
+            </a:r>
+          </a:p>
+          <a:p>
+            <a:pPr lvl="0"/>
+            <a:r>
+              <a:rPr lang="fr-FR" dirty="0"/>
+              <a:t>Visualisation des stocks du magasin</a:t>
+            </a:r>
+          </a:p>
+          <a:p>
+            <a:pPr lvl="0"/>
+            <a:r>
+              <a:rPr lang="fr-FR" dirty="0"/>
+              <a:t>Passage de commande</a:t>
+            </a:r>
+          </a:p>
+          <a:p>
+            <a:pPr lvl="0"/>
+            <a:r>
+              <a:rPr lang="fr-FR" dirty="0"/>
+              <a:t>Configuration de tous les seuils du logiciel</a:t>
+            </a:r>
+          </a:p>
+          <a:p>
+            <a:pPr lvl="0"/>
+            <a:r>
+              <a:rPr lang="fr-FR" dirty="0"/>
+              <a:t>Ajout / Suppression d’heure de pointe</a:t>
+            </a:r>
+          </a:p>
+          <a:p>
+            <a:pPr lvl="0"/>
+            <a:r>
+              <a:rPr lang="fr-FR"/>
+              <a:t>Visualisation des statistiques du magasin</a:t>
+            </a:r>
+          </a:p>
+          <a:p>
             <a:pPr>
               <a:buClr>
                 <a:srgbClr val="6699CC"/>
               </a:buClr>
             </a:pPr>
-            <a:r>
-              <a:rPr lang="fr-FR" dirty="0" smtClean="0"/>
-              <a:t>Visualisation des stocks (congélateur / vente)</a:t>
-            </a:r>
-          </a:p>
-          <a:p>
-            <a:pPr>
-              <a:buClr>
-                <a:srgbClr val="6699CC"/>
-              </a:buClr>
-            </a:pPr>
-            <a:r>
-              <a:rPr lang="fr-FR" dirty="0" smtClean="0"/>
-              <a:t>Ajout automatique</a:t>
-            </a:r>
-          </a:p>
-          <a:p>
-            <a:pPr lvl="1">
-              <a:buClr>
-                <a:srgbClr val="6699CC"/>
-              </a:buClr>
-            </a:pPr>
-            <a:r>
-              <a:rPr lang="fr-FR" dirty="0" smtClean="0"/>
-              <a:t>Produits à cuire</a:t>
-            </a:r>
-          </a:p>
-          <a:p>
-            <a:pPr lvl="1">
-              <a:buClr>
-                <a:srgbClr val="6699CC"/>
-              </a:buClr>
-            </a:pPr>
-            <a:r>
-              <a:rPr lang="fr-FR" dirty="0" smtClean="0"/>
-              <a:t>Produits à mettre en rayon</a:t>
-            </a:r>
-          </a:p>
-          <a:p>
-            <a:pPr>
-              <a:buClr>
-                <a:srgbClr val="6699CC"/>
-              </a:buClr>
-            </a:pPr>
-            <a:r>
-              <a:rPr lang="fr-FR" dirty="0" smtClean="0"/>
-              <a:t>Visualisation des produits au four</a:t>
-            </a:r>
             <a:endParaRPr lang="fr-FR" dirty="0"/>
           </a:p>
         </p:txBody>
@@ -17761,7 +19137,7 @@
                   <a:srgbClr val="336699"/>
                 </a:solidFill>
               </a:rPr>
-              <a:t>L’interface vendeur</a:t>
+              <a:t>L’interface Employé de cuisson</a:t>
             </a:r>
             <a:endParaRPr lang="fr-FR" dirty="0">
               <a:solidFill>
@@ -17788,7 +19164,7 @@
           <a:p>
             <a:fld id="{A5DF02B5-C084-4573-B9AA-1687D980E5FB}" type="datetime1">
               <a:rPr lang="fr-FR" smtClean="0"/>
-              <a:t>30/12/2014</a:t>
+              <a:t>03/01/2015</a:t>
             </a:fld>
             <a:endParaRPr lang="fr-BE"/>
           </a:p>
@@ -17915,6 +19291,54 @@
                 <a:srgbClr val="6699CC"/>
               </a:buClr>
             </a:pPr>
+            <a:r>
+              <a:rPr lang="fr-FR" dirty="0" smtClean="0"/>
+              <a:t>Visualisation des stocks (congélateur / vente)</a:t>
+            </a:r>
+          </a:p>
+          <a:p>
+            <a:pPr>
+              <a:buClr>
+                <a:srgbClr val="6699CC"/>
+              </a:buClr>
+            </a:pPr>
+            <a:r>
+              <a:rPr lang="fr-FR" dirty="0" smtClean="0"/>
+              <a:t>Ajout automatique</a:t>
+            </a:r>
+          </a:p>
+          <a:p>
+            <a:pPr lvl="1">
+              <a:buClr>
+                <a:srgbClr val="6699CC"/>
+              </a:buClr>
+            </a:pPr>
+            <a:r>
+              <a:rPr lang="fr-FR" dirty="0" smtClean="0"/>
+              <a:t>Produits à cuire</a:t>
+            </a:r>
+          </a:p>
+          <a:p>
+            <a:pPr lvl="1">
+              <a:buClr>
+                <a:srgbClr val="6699CC"/>
+              </a:buClr>
+            </a:pPr>
+            <a:r>
+              <a:rPr lang="fr-FR" dirty="0" smtClean="0"/>
+              <a:t>Produits à mettre en rayon</a:t>
+            </a:r>
+          </a:p>
+          <a:p>
+            <a:pPr>
+              <a:buClr>
+                <a:srgbClr val="6699CC"/>
+              </a:buClr>
+            </a:pPr>
+            <a:r>
+              <a:rPr lang="fr-FR" dirty="0" smtClean="0"/>
+              <a:t>Visualisation des produits au four</a:t>
+            </a:r>
             <a:endParaRPr lang="fr-FR" dirty="0"/>
           </a:p>
         </p:txBody>
@@ -17958,7 +19382,7 @@
       </p:grpSpPr>
       <p:sp>
         <p:nvSpPr>
-          <p:cNvPr id="6" name="Titre 5"/>
+          <p:cNvPr id="2" name="Titre 1"/>
           <p:cNvSpPr>
             <a:spLocks noGrp="1"/>
           </p:cNvSpPr>
@@ -17968,21 +19392,22 @@
         </p:nvSpPr>
         <p:spPr>
           <a:xfrm>
-            <a:off x="685800" y="2636912"/>
-            <a:ext cx="7772400" cy="1362075"/>
+            <a:off x="446856" y="188640"/>
+            <a:ext cx="8373616" cy="796950"/>
           </a:xfrm>
         </p:spPr>
         <p:txBody>
           <a:bodyPr/>
           <a:lstStyle/>
           <a:p>
+            <a:pPr algn="r"/>
             <a:r>
               <a:rPr lang="fr-FR" dirty="0" smtClean="0">
                 <a:solidFill>
                   <a:srgbClr val="336699"/>
                 </a:solidFill>
               </a:rPr>
-              <a:t>Choix techniques et d’architecture</a:t>
+              <a:t>L’interface vendeur</a:t>
             </a:r>
             <a:endParaRPr lang="fr-FR" dirty="0">
               <a:solidFill>
@@ -18007,9 +19432,9 @@
           <a:bodyPr/>
           <a:lstStyle/>
           <a:p>
-            <a:fld id="{C2D65230-C684-41AF-AA0D-72F719444CFB}" type="datetime1">
+            <a:fld id="{A5DF02B5-C084-4573-B9AA-1687D980E5FB}" type="datetime1">
               <a:rPr lang="fr-FR" smtClean="0"/>
-              <a:t>30/12/2014</a:t>
+              <a:t>03/01/2015</a:t>
             </a:fld>
             <a:endParaRPr lang="fr-BE"/>
           </a:p>
@@ -18038,58 +19463,112 @@
           </a:p>
         </p:txBody>
       </p:sp>
-      <p:sp>
-        <p:nvSpPr>
-          <p:cNvPr id="9" name="Rectangle 8"/>
-          <p:cNvSpPr/>
+      <p:cxnSp>
+        <p:nvCxnSpPr>
+          <p:cNvPr id="8" name="Connecteur droit 7"/>
+          <p:cNvCxnSpPr/>
           <p:nvPr/>
-        </p:nvSpPr>
+        </p:nvCxnSpPr>
         <p:spPr>
           <a:xfrm>
-            <a:off x="0" y="4196234"/>
-            <a:ext cx="9144000" cy="360040"/>
+            <a:off x="467544" y="908720"/>
+            <a:ext cx="8208912" cy="0"/>
           </a:xfrm>
-          <a:prstGeom prst="rect">
+          <a:prstGeom prst="line">
             <a:avLst/>
           </a:prstGeom>
-          <a:solidFill>
-            <a:schemeClr val="tx2"/>
-          </a:solidFill>
-          <a:ln>
-            <a:solidFill>
-              <a:schemeClr val="tx2"/>
-            </a:solidFill>
-          </a:ln>
         </p:spPr>
         <p:style>
-          <a:lnRef idx="2">
-            <a:schemeClr val="accent1">
-              <a:shade val="50000"/>
-            </a:schemeClr>
+          <a:lnRef idx="1">
+            <a:schemeClr val="accent1"/>
           </a:lnRef>
-          <a:fillRef idx="1">
+          <a:fillRef idx="0">
             <a:schemeClr val="accent1"/>
           </a:fillRef>
           <a:effectRef idx="0">
             <a:schemeClr val="accent1"/>
           </a:effectRef>
           <a:fontRef idx="minor">
-            <a:schemeClr val="lt1"/>
+            <a:schemeClr val="tx1"/>
           </a:fontRef>
         </p:style>
+      </p:cxnSp>
+      <p:sp>
+        <p:nvSpPr>
+          <p:cNvPr id="10" name="ZoneTexte 9"/>
+          <p:cNvSpPr txBox="1"/>
+          <p:nvPr/>
+        </p:nvSpPr>
+        <p:spPr>
+          <a:xfrm>
+            <a:off x="1763777" y="6309320"/>
+            <a:ext cx="5616446" cy="369332"/>
+          </a:xfrm>
+          <a:prstGeom prst="rect">
+            <a:avLst/>
+          </a:prstGeom>
+          <a:noFill/>
+        </p:spPr>
         <p:txBody>
-          <a:bodyPr rtlCol="0" anchor="ctr"/>
+          <a:bodyPr wrap="square" rtlCol="0">
+            <a:spAutoFit/>
+          </a:bodyPr>
           <a:lstStyle/>
           <a:p>
             <a:pPr algn="ctr"/>
-            <a:endParaRPr lang="fr-FR"/>
+            <a:r>
+              <a:rPr lang="fr-FR" dirty="0" smtClean="0">
+                <a:solidFill>
+                  <a:schemeClr val="bg1">
+                    <a:lumMod val="50000"/>
+                  </a:schemeClr>
+                </a:solidFill>
+              </a:rPr>
+              <a:t>Présentation du logiciel</a:t>
+            </a:r>
+            <a:endParaRPr lang="fr-FR" dirty="0">
+              <a:solidFill>
+                <a:schemeClr val="bg1">
+                  <a:lumMod val="50000"/>
+                </a:schemeClr>
+              </a:solidFill>
+            </a:endParaRPr>
+          </a:p>
+        </p:txBody>
+      </p:sp>
+      <p:sp>
+        <p:nvSpPr>
+          <p:cNvPr id="3" name="Espace réservé du contenu 2"/>
+          <p:cNvSpPr>
+            <a:spLocks noGrp="1"/>
+          </p:cNvSpPr>
+          <p:nvPr>
+            <p:ph idx="1"/>
+          </p:nvPr>
+        </p:nvSpPr>
+        <p:spPr>
+          <a:xfrm>
+            <a:off x="457200" y="1600200"/>
+            <a:ext cx="8229600" cy="4349079"/>
+          </a:xfrm>
+        </p:spPr>
+        <p:txBody>
+          <a:bodyPr/>
+          <a:lstStyle/>
+          <a:p>
+            <a:pPr>
+              <a:buClr>
+                <a:srgbClr val="6699CC"/>
+              </a:buClr>
+            </a:pPr>
+            <a:endParaRPr lang="fr-FR" dirty="0"/>
           </a:p>
         </p:txBody>
       </p:sp>
     </p:spTree>
     <p:extLst>
       <p:ext uri="{BB962C8B-B14F-4D97-AF65-F5344CB8AC3E}">
-        <p14:creationId xmlns:p14="http://schemas.microsoft.com/office/powerpoint/2010/main" val="3480954234"/>
+        <p14:creationId xmlns:p14="http://schemas.microsoft.com/office/powerpoint/2010/main" val="2219268645"/>
       </p:ext>
     </p:extLst>
   </p:cSld>

</xml_diff>